<commit_message>
Added Convension and Participant controller logic
</commit_message>
<xml_diff>
--- a/Convension case.pptx
+++ b/Convension case.pptx
@@ -5,7 +5,7 @@
     <p:sldMasterId id="2147483648" r:id="rId1"/>
   </p:sldMasterIdLst>
   <p:notesMasterIdLst>
-    <p:notesMasterId r:id="rId12"/>
+    <p:notesMasterId r:id="rId14"/>
   </p:notesMasterIdLst>
   <p:sldIdLst>
     <p:sldId id="256" r:id="rId2"/>
@@ -13,11 +13,13 @@
     <p:sldId id="260" r:id="rId4"/>
     <p:sldId id="264" r:id="rId5"/>
     <p:sldId id="262" r:id="rId6"/>
-    <p:sldId id="261" r:id="rId7"/>
-    <p:sldId id="258" r:id="rId8"/>
-    <p:sldId id="268" r:id="rId9"/>
-    <p:sldId id="265" r:id="rId10"/>
-    <p:sldId id="266" r:id="rId11"/>
+    <p:sldId id="270" r:id="rId7"/>
+    <p:sldId id="269" r:id="rId8"/>
+    <p:sldId id="261" r:id="rId9"/>
+    <p:sldId id="258" r:id="rId10"/>
+    <p:sldId id="268" r:id="rId11"/>
+    <p:sldId id="265" r:id="rId12"/>
+    <p:sldId id="266" r:id="rId13"/>
   </p:sldIdLst>
   <p:sldSz cx="12192000" cy="6858000"/>
   <p:notesSz cx="6858000" cy="9144000"/>
@@ -116,6 +118,11 @@
       </a:defRPr>
     </a:lvl9pPr>
   </p:defaultTextStyle>
+  <p:extLst>
+    <p:ext uri="{EFAFB233-063F-42B5-8137-9DF3F51BA10A}">
+      <p15:sldGuideLst xmlns:p15="http://schemas.microsoft.com/office/powerpoint/2012/main"/>
+    </p:ext>
+  </p:extLst>
 </p:presentation>
 </file>
 
@@ -543,6 +550,174 @@
     <p:extLst>
       <p:ext uri="{BB962C8B-B14F-4D97-AF65-F5344CB8AC3E}">
         <p14:creationId xmlns:p14="http://schemas.microsoft.com/office/powerpoint/2010/main" val="3862107812"/>
+      </p:ext>
+    </p:extLst>
+  </p:cSld>
+  <p:clrMapOvr>
+    <a:masterClrMapping/>
+  </p:clrMapOvr>
+</p:notes>
+</file>
+
+<file path=ppt/notesSlides/notesSlide2.xml><?xml version="1.0" encoding="utf-8"?>
+<p:notes xmlns:a="http://schemas.openxmlformats.org/drawingml/2006/main" xmlns:r="http://schemas.openxmlformats.org/officeDocument/2006/relationships" xmlns:p="http://schemas.openxmlformats.org/presentationml/2006/main">
+  <p:cSld>
+    <p:spTree>
+      <p:nvGrpSpPr>
+        <p:cNvPr id="1" name=""/>
+        <p:cNvGrpSpPr/>
+        <p:nvPr/>
+      </p:nvGrpSpPr>
+      <p:grpSpPr>
+        <a:xfrm>
+          <a:off x="0" y="0"/>
+          <a:ext cx="0" cy="0"/>
+          <a:chOff x="0" y="0"/>
+          <a:chExt cx="0" cy="0"/>
+        </a:xfrm>
+      </p:grpSpPr>
+      <p:sp>
+        <p:nvSpPr>
+          <p:cNvPr id="2" name="Pladsholder til slidebillede 1"/>
+          <p:cNvSpPr>
+            <a:spLocks noGrp="1" noRot="1" noChangeAspect="1"/>
+          </p:cNvSpPr>
+          <p:nvPr>
+            <p:ph type="sldImg"/>
+          </p:nvPr>
+        </p:nvSpPr>
+        <p:spPr/>
+      </p:sp>
+      <p:sp>
+        <p:nvSpPr>
+          <p:cNvPr id="3" name="Pladsholder til noter 2"/>
+          <p:cNvSpPr>
+            <a:spLocks noGrp="1"/>
+          </p:cNvSpPr>
+          <p:nvPr>
+            <p:ph type="body" idx="1"/>
+          </p:nvPr>
+        </p:nvSpPr>
+        <p:spPr/>
+        <p:txBody>
+          <a:bodyPr/>
+          <a:lstStyle/>
+          <a:p>
+            <a:endParaRPr lang="da-DK" dirty="0"/>
+          </a:p>
+        </p:txBody>
+      </p:sp>
+      <p:sp>
+        <p:nvSpPr>
+          <p:cNvPr id="4" name="Pladsholder til slidenummer 3"/>
+          <p:cNvSpPr>
+            <a:spLocks noGrp="1"/>
+          </p:cNvSpPr>
+          <p:nvPr>
+            <p:ph type="sldNum" sz="quarter" idx="5"/>
+          </p:nvPr>
+        </p:nvSpPr>
+        <p:spPr/>
+        <p:txBody>
+          <a:bodyPr/>
+          <a:lstStyle/>
+          <a:p>
+            <a:fld id="{49DCB78C-D3AC-6945-8391-6DF35C1DD528}" type="slidenum">
+              <a:rPr lang="da-DK" smtClean="0"/>
+              <a:t>6</a:t>
+            </a:fld>
+            <a:endParaRPr lang="da-DK"/>
+          </a:p>
+        </p:txBody>
+      </p:sp>
+    </p:spTree>
+    <p:extLst>
+      <p:ext uri="{BB962C8B-B14F-4D97-AF65-F5344CB8AC3E}">
+        <p14:creationId xmlns:p14="http://schemas.microsoft.com/office/powerpoint/2010/main" val="979474422"/>
+      </p:ext>
+    </p:extLst>
+  </p:cSld>
+  <p:clrMapOvr>
+    <a:masterClrMapping/>
+  </p:clrMapOvr>
+</p:notes>
+</file>
+
+<file path=ppt/notesSlides/notesSlide3.xml><?xml version="1.0" encoding="utf-8"?>
+<p:notes xmlns:a="http://schemas.openxmlformats.org/drawingml/2006/main" xmlns:r="http://schemas.openxmlformats.org/officeDocument/2006/relationships" xmlns:p="http://schemas.openxmlformats.org/presentationml/2006/main">
+  <p:cSld>
+    <p:spTree>
+      <p:nvGrpSpPr>
+        <p:cNvPr id="1" name=""/>
+        <p:cNvGrpSpPr/>
+        <p:nvPr/>
+      </p:nvGrpSpPr>
+      <p:grpSpPr>
+        <a:xfrm>
+          <a:off x="0" y="0"/>
+          <a:ext cx="0" cy="0"/>
+          <a:chOff x="0" y="0"/>
+          <a:chExt cx="0" cy="0"/>
+        </a:xfrm>
+      </p:grpSpPr>
+      <p:sp>
+        <p:nvSpPr>
+          <p:cNvPr id="2" name="Pladsholder til slidebillede 1"/>
+          <p:cNvSpPr>
+            <a:spLocks noGrp="1" noRot="1" noChangeAspect="1"/>
+          </p:cNvSpPr>
+          <p:nvPr>
+            <p:ph type="sldImg"/>
+          </p:nvPr>
+        </p:nvSpPr>
+        <p:spPr/>
+      </p:sp>
+      <p:sp>
+        <p:nvSpPr>
+          <p:cNvPr id="3" name="Pladsholder til noter 2"/>
+          <p:cNvSpPr>
+            <a:spLocks noGrp="1"/>
+          </p:cNvSpPr>
+          <p:nvPr>
+            <p:ph type="body" idx="1"/>
+          </p:nvPr>
+        </p:nvSpPr>
+        <p:spPr/>
+        <p:txBody>
+          <a:bodyPr/>
+          <a:lstStyle/>
+          <a:p>
+            <a:endParaRPr lang="da-DK" dirty="0"/>
+          </a:p>
+        </p:txBody>
+      </p:sp>
+      <p:sp>
+        <p:nvSpPr>
+          <p:cNvPr id="4" name="Pladsholder til slidenummer 3"/>
+          <p:cNvSpPr>
+            <a:spLocks noGrp="1"/>
+          </p:cNvSpPr>
+          <p:nvPr>
+            <p:ph type="sldNum" sz="quarter" idx="5"/>
+          </p:nvPr>
+        </p:nvSpPr>
+        <p:spPr/>
+        <p:txBody>
+          <a:bodyPr/>
+          <a:lstStyle/>
+          <a:p>
+            <a:fld id="{49DCB78C-D3AC-6945-8391-6DF35C1DD528}" type="slidenum">
+              <a:rPr lang="da-DK" smtClean="0"/>
+              <a:t>7</a:t>
+            </a:fld>
+            <a:endParaRPr lang="da-DK"/>
+          </a:p>
+        </p:txBody>
+      </p:sp>
+    </p:spTree>
+    <p:extLst>
+      <p:ext uri="{BB962C8B-B14F-4D97-AF65-F5344CB8AC3E}">
+        <p14:creationId xmlns:p14="http://schemas.microsoft.com/office/powerpoint/2010/main" val="523228240"/>
       </p:ext>
     </p:extLst>
   </p:cSld>
@@ -4046,6 +4221,1518 @@
           <a:lstStyle/>
           <a:p>
             <a:r>
+              <a:rPr lang="da-DK" sz="4600">
+                <a:solidFill>
+                  <a:srgbClr val="FFFFFF"/>
+                </a:solidFill>
+              </a:rPr>
+              <a:t>Infrastucture solution</a:t>
+            </a:r>
+          </a:p>
+        </p:txBody>
+      </p:sp>
+      <p:sp>
+        <p:nvSpPr>
+          <p:cNvPr id="3" name="Pladsholder til indhold 2">
+            <a:extLst>
+              <a:ext uri="{FF2B5EF4-FFF2-40B4-BE49-F238E27FC236}">
+                <a16:creationId xmlns:a16="http://schemas.microsoft.com/office/drawing/2014/main" id="{7364B8A9-43EA-665A-7052-5CAA16B615D4}"/>
+              </a:ext>
+            </a:extLst>
+          </p:cNvPr>
+          <p:cNvSpPr>
+            <a:spLocks noGrp="1"/>
+          </p:cNvSpPr>
+          <p:nvPr>
+            <p:ph idx="1"/>
+          </p:nvPr>
+        </p:nvSpPr>
+        <p:spPr>
+          <a:xfrm>
+            <a:off x="838200" y="2438400"/>
+            <a:ext cx="10515600" cy="3738562"/>
+          </a:xfrm>
+        </p:spPr>
+        <p:txBody>
+          <a:bodyPr>
+            <a:noAutofit/>
+          </a:bodyPr>
+          <a:lstStyle/>
+          <a:p>
+            <a:pPr lvl="1"/>
+            <a:r>
+              <a:rPr lang="da-DK" sz="1400" dirty="0"/>
+              <a:t>Api </a:t>
+            </a:r>
+            <a:r>
+              <a:rPr lang="da-DK" sz="1400" dirty="0" err="1"/>
+              <a:t>that</a:t>
+            </a:r>
+            <a:r>
+              <a:rPr lang="da-DK" sz="1400" dirty="0"/>
+              <a:t> </a:t>
+            </a:r>
+            <a:r>
+              <a:rPr lang="da-DK" sz="1400" dirty="0" err="1"/>
+              <a:t>implements</a:t>
+            </a:r>
+            <a:r>
+              <a:rPr lang="da-DK" sz="1400" dirty="0"/>
+              <a:t> a </a:t>
+            </a:r>
+            <a:r>
+              <a:rPr lang="da-DK" sz="1400" dirty="0" err="1"/>
+              <a:t>Waf</a:t>
+            </a:r>
+            <a:r>
+              <a:rPr lang="da-DK" sz="1400" dirty="0"/>
+              <a:t>, </a:t>
+            </a:r>
+            <a:r>
+              <a:rPr lang="da-DK" sz="1400" dirty="0" err="1"/>
+              <a:t>network</a:t>
+            </a:r>
+            <a:r>
+              <a:rPr lang="da-DK" sz="1400" dirty="0"/>
+              <a:t> </a:t>
+            </a:r>
+            <a:r>
+              <a:rPr lang="da-DK" sz="1400" dirty="0" err="1"/>
+              <a:t>loadbalancer</a:t>
+            </a:r>
+            <a:r>
+              <a:rPr lang="da-DK" sz="1400" dirty="0"/>
+              <a:t> and </a:t>
+            </a:r>
+            <a:r>
+              <a:rPr lang="da-DK" sz="1400" dirty="0" err="1"/>
+              <a:t>ecs</a:t>
+            </a:r>
+            <a:r>
+              <a:rPr lang="da-DK" sz="1400" dirty="0"/>
+              <a:t> service.</a:t>
+            </a:r>
+          </a:p>
+          <a:p>
+            <a:pPr lvl="2"/>
+            <a:r>
+              <a:rPr lang="da-DK" sz="1400" dirty="0"/>
+              <a:t>Security </a:t>
+            </a:r>
+            <a:r>
+              <a:rPr lang="da-DK" sz="1400" dirty="0" err="1"/>
+              <a:t>groups</a:t>
+            </a:r>
+            <a:r>
+              <a:rPr lang="da-DK" sz="1400" dirty="0"/>
+              <a:t> </a:t>
+            </a:r>
+            <a:r>
+              <a:rPr lang="da-DK" sz="1400" dirty="0" err="1"/>
+              <a:t>that</a:t>
+            </a:r>
+            <a:r>
+              <a:rPr lang="da-DK" sz="1400" dirty="0"/>
+              <a:t> </a:t>
+            </a:r>
+            <a:r>
+              <a:rPr lang="da-DK" sz="1400" dirty="0" err="1"/>
+              <a:t>resticts</a:t>
+            </a:r>
+            <a:r>
+              <a:rPr lang="da-DK" sz="1400" dirty="0"/>
+              <a:t> </a:t>
+            </a:r>
+            <a:r>
+              <a:rPr lang="da-DK" sz="1400" dirty="0" err="1"/>
+              <a:t>only</a:t>
+            </a:r>
+            <a:r>
+              <a:rPr lang="da-DK" sz="1400" dirty="0"/>
+              <a:t> </a:t>
+            </a:r>
+            <a:r>
+              <a:rPr lang="da-DK" sz="1400" dirty="0" err="1"/>
+              <a:t>traffic</a:t>
+            </a:r>
+            <a:r>
+              <a:rPr lang="da-DK" sz="1400" dirty="0"/>
+              <a:t> of </a:t>
+            </a:r>
+            <a:r>
+              <a:rPr lang="da-DK" sz="1400" dirty="0" err="1"/>
+              <a:t>https</a:t>
+            </a:r>
+            <a:r>
+              <a:rPr lang="da-DK" sz="1400" dirty="0"/>
+              <a:t> </a:t>
+            </a:r>
+            <a:r>
+              <a:rPr lang="da-DK" sz="1400" dirty="0" err="1"/>
+              <a:t>between</a:t>
+            </a:r>
+            <a:r>
+              <a:rPr lang="da-DK" sz="1400" dirty="0"/>
+              <a:t> WAF, ALB, </a:t>
+            </a:r>
+            <a:r>
+              <a:rPr lang="da-DK" sz="1400" dirty="0" err="1"/>
+              <a:t>ecs</a:t>
+            </a:r>
+            <a:r>
+              <a:rPr lang="da-DK" sz="1400" dirty="0"/>
+              <a:t> service and </a:t>
+            </a:r>
+            <a:r>
+              <a:rPr lang="da-DK" sz="1400" dirty="0" err="1"/>
+              <a:t>outbound</a:t>
+            </a:r>
+            <a:r>
+              <a:rPr lang="da-DK" sz="1400" dirty="0"/>
+              <a:t> </a:t>
+            </a:r>
+            <a:r>
+              <a:rPr lang="da-DK" sz="1400" dirty="0" err="1"/>
+              <a:t>traffic</a:t>
+            </a:r>
+            <a:r>
+              <a:rPr lang="da-DK" sz="1400" dirty="0"/>
+              <a:t> to </a:t>
+            </a:r>
+            <a:r>
+              <a:rPr lang="da-DK" sz="1400" dirty="0" err="1"/>
+              <a:t>client</a:t>
+            </a:r>
+            <a:r>
+              <a:rPr lang="da-DK" sz="1400" dirty="0"/>
+              <a:t> and </a:t>
+            </a:r>
+            <a:r>
+              <a:rPr lang="da-DK" sz="1400" dirty="0" err="1"/>
+              <a:t>openid</a:t>
+            </a:r>
+            <a:r>
+              <a:rPr lang="da-DK" sz="1400" dirty="0"/>
+              <a:t> </a:t>
+            </a:r>
+            <a:r>
+              <a:rPr lang="da-DK" sz="1400" dirty="0" err="1"/>
+              <a:t>provider</a:t>
+            </a:r>
+            <a:r>
+              <a:rPr lang="da-DK" sz="1400" dirty="0"/>
+              <a:t>. If the </a:t>
+            </a:r>
+            <a:r>
+              <a:rPr lang="da-DK" sz="1400" dirty="0" err="1"/>
+              <a:t>openid</a:t>
+            </a:r>
+            <a:r>
+              <a:rPr lang="da-DK" sz="1400" dirty="0"/>
+              <a:t> </a:t>
+            </a:r>
+            <a:r>
+              <a:rPr lang="da-DK" sz="1400" dirty="0" err="1"/>
+              <a:t>provider</a:t>
+            </a:r>
+            <a:r>
+              <a:rPr lang="da-DK" sz="1400" dirty="0"/>
+              <a:t> is </a:t>
+            </a:r>
+            <a:r>
+              <a:rPr lang="da-DK" sz="1400" dirty="0" err="1"/>
+              <a:t>inside</a:t>
+            </a:r>
+            <a:r>
+              <a:rPr lang="da-DK" sz="1400" dirty="0"/>
+              <a:t> </a:t>
+            </a:r>
+          </a:p>
+          <a:p>
+            <a:pPr lvl="2"/>
+            <a:r>
+              <a:rPr lang="da-DK" sz="1400" dirty="0" err="1"/>
+              <a:t>Secutity</a:t>
+            </a:r>
+            <a:r>
+              <a:rPr lang="da-DK" sz="1400" dirty="0"/>
+              <a:t> </a:t>
+            </a:r>
+            <a:r>
+              <a:rPr lang="da-DK" sz="1400" dirty="0" err="1"/>
+              <a:t>group</a:t>
+            </a:r>
+            <a:r>
+              <a:rPr lang="da-DK" sz="1400" dirty="0"/>
+              <a:t> </a:t>
+            </a:r>
+            <a:r>
+              <a:rPr lang="da-DK" sz="1400" dirty="0" err="1"/>
+              <a:t>that</a:t>
+            </a:r>
+            <a:r>
+              <a:rPr lang="da-DK" sz="1400" dirty="0"/>
+              <a:t> </a:t>
+            </a:r>
+            <a:r>
+              <a:rPr lang="da-DK" sz="1400" dirty="0" err="1"/>
+              <a:t>allows</a:t>
+            </a:r>
+            <a:r>
+              <a:rPr lang="da-DK" sz="1400" dirty="0"/>
+              <a:t> </a:t>
+            </a:r>
+            <a:r>
+              <a:rPr lang="da-DK" sz="1400" dirty="0" err="1"/>
+              <a:t>ecs</a:t>
+            </a:r>
+            <a:r>
+              <a:rPr lang="da-DK" sz="1400" dirty="0"/>
+              <a:t> service to </a:t>
+            </a:r>
+            <a:r>
+              <a:rPr lang="da-DK" sz="1400" dirty="0" err="1"/>
+              <a:t>call</a:t>
+            </a:r>
+            <a:r>
+              <a:rPr lang="da-DK" sz="1400" dirty="0"/>
+              <a:t> RDS</a:t>
+            </a:r>
+          </a:p>
+          <a:p>
+            <a:pPr lvl="2"/>
+            <a:r>
+              <a:rPr lang="da-DK" sz="1400" dirty="0"/>
+              <a:t>IAM </a:t>
+            </a:r>
+            <a:r>
+              <a:rPr lang="da-DK" sz="1400" dirty="0" err="1"/>
+              <a:t>roles</a:t>
+            </a:r>
+            <a:r>
+              <a:rPr lang="da-DK" sz="1400" dirty="0"/>
+              <a:t> </a:t>
+            </a:r>
+            <a:r>
+              <a:rPr lang="da-DK" sz="1400" dirty="0" err="1"/>
+              <a:t>that</a:t>
+            </a:r>
+            <a:r>
+              <a:rPr lang="da-DK" sz="1400" dirty="0"/>
+              <a:t> </a:t>
+            </a:r>
+            <a:r>
+              <a:rPr lang="da-DK" sz="1400" dirty="0" err="1"/>
+              <a:t>lock</a:t>
+            </a:r>
+            <a:r>
+              <a:rPr lang="da-DK" sz="1400" dirty="0"/>
+              <a:t> </a:t>
+            </a:r>
+            <a:r>
+              <a:rPr lang="da-DK" sz="1400" dirty="0" err="1"/>
+              <a:t>down</a:t>
+            </a:r>
+            <a:r>
+              <a:rPr lang="da-DK" sz="1400" dirty="0"/>
+              <a:t> </a:t>
+            </a:r>
+            <a:r>
+              <a:rPr lang="da-DK" sz="1400" dirty="0" err="1"/>
+              <a:t>access</a:t>
+            </a:r>
+            <a:r>
+              <a:rPr lang="da-DK" sz="1400" dirty="0"/>
+              <a:t> to </a:t>
+            </a:r>
+            <a:r>
+              <a:rPr lang="da-DK" sz="1400" dirty="0" err="1"/>
+              <a:t>only</a:t>
+            </a:r>
+            <a:r>
+              <a:rPr lang="da-DK" sz="1400" dirty="0"/>
+              <a:t> the </a:t>
+            </a:r>
+            <a:r>
+              <a:rPr lang="da-DK" sz="1400" dirty="0" err="1"/>
+              <a:t>resources</a:t>
+            </a:r>
+            <a:r>
+              <a:rPr lang="da-DK" sz="1400" dirty="0"/>
+              <a:t> </a:t>
+            </a:r>
+            <a:r>
+              <a:rPr lang="da-DK" sz="1400" dirty="0" err="1"/>
+              <a:t>that</a:t>
+            </a:r>
+            <a:r>
+              <a:rPr lang="da-DK" sz="1400" dirty="0"/>
+              <a:t> </a:t>
+            </a:r>
+            <a:r>
+              <a:rPr lang="da-DK" sz="1400" dirty="0" err="1"/>
+              <a:t>should</a:t>
+            </a:r>
+            <a:r>
+              <a:rPr lang="da-DK" sz="1400" dirty="0"/>
+              <a:t> </a:t>
+            </a:r>
+            <a:r>
+              <a:rPr lang="da-DK" sz="1400" dirty="0" err="1"/>
+              <a:t>be</a:t>
+            </a:r>
+            <a:r>
+              <a:rPr lang="da-DK" sz="1400" dirty="0"/>
+              <a:t> </a:t>
+            </a:r>
+            <a:r>
+              <a:rPr lang="da-DK" sz="1400" dirty="0" err="1"/>
+              <a:t>accessed</a:t>
+            </a:r>
+            <a:r>
+              <a:rPr lang="da-DK" sz="1400" dirty="0"/>
+              <a:t>.</a:t>
+            </a:r>
+          </a:p>
+          <a:p>
+            <a:pPr lvl="2"/>
+            <a:r>
+              <a:rPr lang="da-DK" sz="1400" dirty="0"/>
+              <a:t>Model on </a:t>
+            </a:r>
+            <a:r>
+              <a:rPr lang="da-DK" sz="1400" dirty="0" err="1"/>
+              <a:t>api</a:t>
+            </a:r>
+            <a:r>
+              <a:rPr lang="da-DK" sz="1400" dirty="0"/>
+              <a:t> gateway </a:t>
+            </a:r>
+            <a:r>
+              <a:rPr lang="da-DK" sz="1400" dirty="0" err="1"/>
+              <a:t>that</a:t>
+            </a:r>
+            <a:r>
+              <a:rPr lang="da-DK" sz="1400" dirty="0"/>
+              <a:t> </a:t>
+            </a:r>
+            <a:r>
+              <a:rPr lang="da-DK" sz="1400" dirty="0" err="1"/>
+              <a:t>does</a:t>
+            </a:r>
+            <a:r>
+              <a:rPr lang="da-DK" sz="1400" dirty="0"/>
+              <a:t> </a:t>
+            </a:r>
+            <a:r>
+              <a:rPr lang="da-DK" sz="1400" dirty="0" err="1"/>
+              <a:t>upfront</a:t>
+            </a:r>
+            <a:r>
+              <a:rPr lang="da-DK" sz="1400" dirty="0"/>
+              <a:t> </a:t>
+            </a:r>
+            <a:r>
+              <a:rPr lang="da-DK" sz="1400" dirty="0" err="1"/>
+              <a:t>validation</a:t>
+            </a:r>
+            <a:r>
+              <a:rPr lang="da-DK" sz="1400" dirty="0"/>
+              <a:t> of </a:t>
+            </a:r>
+            <a:r>
+              <a:rPr lang="da-DK" sz="1400" dirty="0" err="1"/>
+              <a:t>request</a:t>
+            </a:r>
+            <a:r>
+              <a:rPr lang="da-DK" sz="1400" dirty="0"/>
+              <a:t> and </a:t>
+            </a:r>
+            <a:r>
+              <a:rPr lang="da-DK" sz="1400" dirty="0" err="1"/>
+              <a:t>openId</a:t>
+            </a:r>
+            <a:r>
+              <a:rPr lang="da-DK" sz="1400" dirty="0"/>
+              <a:t>, so </a:t>
+            </a:r>
+            <a:r>
+              <a:rPr lang="da-DK" sz="1400" dirty="0" err="1"/>
+              <a:t>backend</a:t>
+            </a:r>
+            <a:r>
+              <a:rPr lang="da-DK" sz="1400" dirty="0"/>
+              <a:t> services </a:t>
+            </a:r>
+            <a:r>
+              <a:rPr lang="da-DK" sz="1400" dirty="0" err="1"/>
+              <a:t>are</a:t>
+            </a:r>
+            <a:r>
+              <a:rPr lang="da-DK" sz="1400" dirty="0"/>
+              <a:t> not </a:t>
+            </a:r>
+            <a:r>
+              <a:rPr lang="da-DK" sz="1400" dirty="0" err="1"/>
+              <a:t>being</a:t>
+            </a:r>
+            <a:r>
+              <a:rPr lang="da-DK" sz="1400" dirty="0"/>
+              <a:t> </a:t>
+            </a:r>
+            <a:r>
+              <a:rPr lang="da-DK" sz="1400" dirty="0" err="1"/>
+              <a:t>called</a:t>
+            </a:r>
+            <a:r>
+              <a:rPr lang="da-DK" sz="1400" dirty="0"/>
+              <a:t> </a:t>
+            </a:r>
+            <a:r>
+              <a:rPr lang="da-DK" sz="1400" dirty="0" err="1"/>
+              <a:t>if</a:t>
+            </a:r>
+            <a:r>
+              <a:rPr lang="da-DK" sz="1400" dirty="0"/>
+              <a:t> user is not </a:t>
+            </a:r>
+            <a:r>
+              <a:rPr lang="da-DK" sz="1400" dirty="0" err="1"/>
+              <a:t>validated</a:t>
+            </a:r>
+            <a:r>
+              <a:rPr lang="da-DK" sz="1400" dirty="0"/>
+              <a:t>. </a:t>
+            </a:r>
+          </a:p>
+          <a:p>
+            <a:pPr lvl="2"/>
+            <a:r>
+              <a:rPr lang="da-DK" sz="1400" dirty="0"/>
+              <a:t>”Usage” of </a:t>
+            </a:r>
+            <a:r>
+              <a:rPr lang="da-DK" sz="1400" dirty="0" err="1"/>
+              <a:t>Aws</a:t>
+            </a:r>
+            <a:r>
+              <a:rPr lang="da-DK" sz="1400" dirty="0"/>
+              <a:t> </a:t>
+            </a:r>
+            <a:r>
+              <a:rPr lang="da-DK" sz="1400" dirty="0" err="1"/>
+              <a:t>identity</a:t>
+            </a:r>
+            <a:r>
+              <a:rPr lang="da-DK" sz="1400" dirty="0"/>
+              <a:t> </a:t>
+            </a:r>
+            <a:r>
+              <a:rPr lang="da-DK" sz="1400" dirty="0" err="1"/>
+              <a:t>provider</a:t>
+            </a:r>
+            <a:r>
+              <a:rPr lang="da-DK" sz="1400" dirty="0"/>
+              <a:t>.</a:t>
+            </a:r>
+          </a:p>
+          <a:p>
+            <a:pPr lvl="2"/>
+            <a:r>
+              <a:rPr lang="da-DK" sz="1400" dirty="0" err="1"/>
+              <a:t>Autoscaling</a:t>
+            </a:r>
+            <a:r>
+              <a:rPr lang="da-DK" sz="1400" dirty="0"/>
+              <a:t> on cpu / </a:t>
+            </a:r>
+            <a:r>
+              <a:rPr lang="da-DK" sz="1400" dirty="0" err="1"/>
+              <a:t>mem</a:t>
+            </a:r>
+            <a:endParaRPr lang="da-DK" sz="1400" dirty="0"/>
+          </a:p>
+          <a:p>
+            <a:pPr lvl="2"/>
+            <a:endParaRPr lang="da-DK" sz="1400" dirty="0"/>
+          </a:p>
+          <a:p>
+            <a:pPr lvl="1"/>
+            <a:r>
+              <a:rPr lang="da-DK" sz="1400" dirty="0"/>
+              <a:t>RDS in a </a:t>
+            </a:r>
+            <a:r>
+              <a:rPr lang="da-DK" sz="1400" dirty="0" err="1"/>
+              <a:t>multi</a:t>
+            </a:r>
+            <a:r>
+              <a:rPr lang="da-DK" sz="1400" dirty="0"/>
+              <a:t> AZ </a:t>
+            </a:r>
+            <a:r>
+              <a:rPr lang="da-DK" sz="1400" dirty="0" err="1"/>
+              <a:t>setup</a:t>
+            </a:r>
+            <a:r>
+              <a:rPr lang="da-DK" sz="1400" dirty="0"/>
+              <a:t>.</a:t>
+            </a:r>
+          </a:p>
+          <a:p>
+            <a:pPr lvl="2"/>
+            <a:r>
+              <a:rPr lang="da-DK" sz="1400" dirty="0"/>
+              <a:t>The RDS has </a:t>
+            </a:r>
+            <a:r>
+              <a:rPr lang="da-DK" sz="1400" dirty="0" err="1"/>
+              <a:t>encryption</a:t>
+            </a:r>
+            <a:r>
+              <a:rPr lang="da-DK" sz="1400" dirty="0"/>
+              <a:t> with a KMS </a:t>
+            </a:r>
+            <a:r>
+              <a:rPr lang="da-DK" sz="1400" dirty="0" err="1"/>
+              <a:t>key</a:t>
+            </a:r>
+            <a:r>
+              <a:rPr lang="da-DK" sz="1400" dirty="0"/>
+              <a:t>. The </a:t>
+            </a:r>
+            <a:r>
+              <a:rPr lang="da-DK" sz="1400" dirty="0" err="1"/>
+              <a:t>kms</a:t>
+            </a:r>
+            <a:r>
+              <a:rPr lang="da-DK" sz="1400" dirty="0"/>
+              <a:t> </a:t>
+            </a:r>
+            <a:r>
+              <a:rPr lang="da-DK" sz="1400" dirty="0" err="1"/>
+              <a:t>key</a:t>
+            </a:r>
+            <a:r>
+              <a:rPr lang="da-DK" sz="1400" dirty="0"/>
+              <a:t> </a:t>
+            </a:r>
+            <a:r>
+              <a:rPr lang="da-DK" sz="1400" dirty="0" err="1"/>
+              <a:t>can</a:t>
+            </a:r>
+            <a:r>
+              <a:rPr lang="da-DK" sz="1400" dirty="0"/>
+              <a:t> </a:t>
+            </a:r>
+            <a:r>
+              <a:rPr lang="da-DK" sz="1400" dirty="0" err="1"/>
+              <a:t>be</a:t>
+            </a:r>
+            <a:r>
+              <a:rPr lang="da-DK" sz="1400" dirty="0"/>
+              <a:t> </a:t>
+            </a:r>
+            <a:r>
+              <a:rPr lang="da-DK" sz="1400" dirty="0" err="1"/>
+              <a:t>managed</a:t>
+            </a:r>
+            <a:r>
+              <a:rPr lang="da-DK" sz="1400" dirty="0"/>
+              <a:t> or </a:t>
+            </a:r>
+            <a:r>
+              <a:rPr lang="da-DK" sz="1400" dirty="0" err="1"/>
+              <a:t>unmanaged</a:t>
+            </a:r>
+            <a:r>
+              <a:rPr lang="da-DK" sz="1400" dirty="0"/>
+              <a:t> </a:t>
+            </a:r>
+            <a:r>
+              <a:rPr lang="da-DK" sz="1400" dirty="0" err="1"/>
+              <a:t>depending</a:t>
+            </a:r>
+            <a:r>
+              <a:rPr lang="da-DK" sz="1400" dirty="0"/>
+              <a:t> on </a:t>
+            </a:r>
+            <a:r>
+              <a:rPr lang="da-DK" sz="1400" dirty="0" err="1"/>
+              <a:t>what</a:t>
+            </a:r>
+            <a:r>
+              <a:rPr lang="da-DK" sz="1400" dirty="0"/>
+              <a:t> the </a:t>
+            </a:r>
+          </a:p>
+          <a:p>
+            <a:pPr lvl="2"/>
+            <a:r>
+              <a:rPr lang="da-DK" sz="1400" dirty="0" err="1"/>
+              <a:t>Consider</a:t>
+            </a:r>
+            <a:r>
+              <a:rPr lang="da-DK" sz="1400" dirty="0"/>
+              <a:t> </a:t>
+            </a:r>
+            <a:r>
+              <a:rPr lang="da-DK" sz="1400" dirty="0" err="1"/>
+              <a:t>usage</a:t>
+            </a:r>
+            <a:r>
+              <a:rPr lang="da-DK" sz="1400" dirty="0"/>
+              <a:t> of </a:t>
+            </a:r>
+            <a:r>
+              <a:rPr lang="da-DK" sz="1400" dirty="0" err="1"/>
+              <a:t>serverless</a:t>
+            </a:r>
+            <a:r>
+              <a:rPr lang="da-DK" sz="1400" dirty="0"/>
+              <a:t> </a:t>
+            </a:r>
+            <a:r>
+              <a:rPr lang="da-DK" sz="1400" dirty="0" err="1"/>
+              <a:t>instance</a:t>
+            </a:r>
+            <a:r>
+              <a:rPr lang="da-DK" sz="1400" dirty="0"/>
+              <a:t> type to </a:t>
+            </a:r>
+            <a:r>
+              <a:rPr lang="da-DK" sz="1400" dirty="0" err="1"/>
+              <a:t>get</a:t>
+            </a:r>
+            <a:r>
+              <a:rPr lang="da-DK" sz="1400" dirty="0"/>
+              <a:t> faster </a:t>
+            </a:r>
+            <a:r>
+              <a:rPr lang="da-DK" sz="1400" dirty="0" err="1"/>
+              <a:t>scaling</a:t>
+            </a:r>
+            <a:r>
+              <a:rPr lang="da-DK" sz="1400" dirty="0"/>
+              <a:t> of </a:t>
+            </a:r>
+            <a:r>
+              <a:rPr lang="da-DK" sz="1400" dirty="0" err="1"/>
+              <a:t>capacity</a:t>
+            </a:r>
+            <a:r>
+              <a:rPr lang="da-DK" sz="1400" dirty="0"/>
+              <a:t> (ACU). </a:t>
+            </a:r>
+            <a:r>
+              <a:rPr lang="da-DK" sz="1400" dirty="0" err="1"/>
+              <a:t>Serverless</a:t>
+            </a:r>
+            <a:r>
+              <a:rPr lang="da-DK" sz="1400" dirty="0"/>
+              <a:t> </a:t>
+            </a:r>
+            <a:r>
+              <a:rPr lang="da-DK" sz="1400" dirty="0" err="1"/>
+              <a:t>should</a:t>
+            </a:r>
+            <a:r>
+              <a:rPr lang="da-DK" sz="1400" dirty="0"/>
+              <a:t> </a:t>
+            </a:r>
+            <a:r>
+              <a:rPr lang="da-DK" sz="1400" dirty="0" err="1"/>
+              <a:t>only</a:t>
+            </a:r>
+            <a:r>
+              <a:rPr lang="da-DK" sz="1400" dirty="0"/>
+              <a:t> </a:t>
+            </a:r>
+            <a:r>
+              <a:rPr lang="da-DK" sz="1400" dirty="0" err="1"/>
+              <a:t>be</a:t>
+            </a:r>
+            <a:r>
+              <a:rPr lang="da-DK" sz="1400" dirty="0"/>
+              <a:t> </a:t>
+            </a:r>
+            <a:r>
+              <a:rPr lang="da-DK" sz="1400" dirty="0" err="1"/>
+              <a:t>used</a:t>
+            </a:r>
+            <a:r>
+              <a:rPr lang="da-DK" sz="1400" dirty="0"/>
+              <a:t> server has time to </a:t>
+            </a:r>
+            <a:r>
+              <a:rPr lang="da-DK" sz="1400" dirty="0" err="1"/>
+              <a:t>scale</a:t>
+            </a:r>
+            <a:r>
+              <a:rPr lang="da-DK" sz="1400" dirty="0"/>
+              <a:t> </a:t>
+            </a:r>
+            <a:r>
+              <a:rPr lang="da-DK" sz="1400" dirty="0" err="1"/>
+              <a:t>down</a:t>
+            </a:r>
+            <a:r>
+              <a:rPr lang="da-DK" sz="1400" dirty="0"/>
+              <a:t> </a:t>
+            </a:r>
+            <a:r>
+              <a:rPr lang="da-DK" sz="1400" dirty="0" err="1"/>
+              <a:t>again</a:t>
+            </a:r>
+            <a:r>
+              <a:rPr lang="da-DK" sz="1400" dirty="0"/>
+              <a:t> and not </a:t>
+            </a:r>
+            <a:r>
+              <a:rPr lang="da-DK" sz="1400" dirty="0" err="1"/>
+              <a:t>always</a:t>
+            </a:r>
+            <a:r>
+              <a:rPr lang="da-DK" sz="1400" dirty="0"/>
+              <a:t> is on max.</a:t>
+            </a:r>
+          </a:p>
+          <a:p>
+            <a:pPr lvl="2"/>
+            <a:endParaRPr lang="da-DK" sz="1400" dirty="0"/>
+          </a:p>
+          <a:p>
+            <a:pPr lvl="1"/>
+            <a:endParaRPr lang="da-DK" sz="1400" dirty="0"/>
+          </a:p>
+        </p:txBody>
+      </p:sp>
+    </p:spTree>
+    <p:extLst>
+      <p:ext uri="{BB962C8B-B14F-4D97-AF65-F5344CB8AC3E}">
+        <p14:creationId xmlns:p14="http://schemas.microsoft.com/office/powerpoint/2010/main" val="236876047"/>
+      </p:ext>
+    </p:extLst>
+  </p:cSld>
+  <p:clrMapOvr>
+    <a:masterClrMapping/>
+  </p:clrMapOvr>
+</p:sld>
+</file>
+
+<file path=ppt/slides/slide11.xml><?xml version="1.0" encoding="utf-8"?>
+<p:sld xmlns:a="http://schemas.openxmlformats.org/drawingml/2006/main" xmlns:r="http://schemas.openxmlformats.org/officeDocument/2006/relationships" xmlns:p="http://schemas.openxmlformats.org/presentationml/2006/main">
+  <p:cSld>
+    <p:bg>
+      <p:bgPr>
+        <a:solidFill>
+          <a:schemeClr val="bg1"/>
+        </a:solidFill>
+        <a:effectLst/>
+      </p:bgPr>
+    </p:bg>
+    <p:spTree>
+      <p:nvGrpSpPr>
+        <p:cNvPr id="1" name=""/>
+        <p:cNvGrpSpPr/>
+        <p:nvPr/>
+      </p:nvGrpSpPr>
+      <p:grpSpPr>
+        <a:xfrm>
+          <a:off x="0" y="0"/>
+          <a:ext cx="0" cy="0"/>
+          <a:chOff x="0" y="0"/>
+          <a:chExt cx="0" cy="0"/>
+        </a:xfrm>
+      </p:grpSpPr>
+      <p:sp>
+        <p:nvSpPr>
+          <p:cNvPr id="8" name="Rectangle 7">
+            <a:extLst>
+              <a:ext uri="{FF2B5EF4-FFF2-40B4-BE49-F238E27FC236}">
+                <a16:creationId xmlns:a16="http://schemas.microsoft.com/office/drawing/2014/main" id="{DE7FFD28-545C-4C88-A2E7-152FB234C92C}"/>
+              </a:ext>
+              <a:ext uri="{C183D7F6-B498-43B3-948B-1728B52AA6E4}">
+                <adec:decorative xmlns:adec="http://schemas.microsoft.com/office/drawing/2017/decorative" val="1"/>
+              </a:ext>
+            </a:extLst>
+          </p:cNvPr>
+          <p:cNvSpPr>
+            <a:spLocks noGrp="1" noRot="1" noChangeAspect="1" noMove="1" noResize="1" noEditPoints="1" noAdjustHandles="1" noChangeArrowheads="1" noChangeShapeType="1" noTextEdit="1"/>
+          </p:cNvSpPr>
+          <p:nvPr>
+            <p:extLst>
+              <p:ext uri="{386F3935-93C4-4BCD-93E2-E3B085C9AB24}">
+                <p16:designElem xmlns:p16="http://schemas.microsoft.com/office/powerpoint/2015/main" val="1"/>
+              </p:ext>
+            </p:extLst>
+          </p:nvPr>
+        </p:nvSpPr>
+        <p:spPr>
+          <a:xfrm>
+            <a:off x="0" y="0"/>
+            <a:ext cx="12192000" cy="1911350"/>
+          </a:xfrm>
+          <a:prstGeom prst="rect">
+            <a:avLst/>
+          </a:prstGeom>
+          <a:solidFill>
+            <a:schemeClr val="accent5"/>
+          </a:solidFill>
+          <a:ln>
+            <a:noFill/>
+          </a:ln>
+        </p:spPr>
+        <p:style>
+          <a:lnRef idx="2">
+            <a:schemeClr val="accent1">
+              <a:shade val="50000"/>
+            </a:schemeClr>
+          </a:lnRef>
+          <a:fillRef idx="1">
+            <a:schemeClr val="accent1"/>
+          </a:fillRef>
+          <a:effectRef idx="0">
+            <a:schemeClr val="accent1"/>
+          </a:effectRef>
+          <a:fontRef idx="minor">
+            <a:schemeClr val="lt1"/>
+          </a:fontRef>
+        </p:style>
+        <p:txBody>
+          <a:bodyPr rtlCol="0" anchor="ctr"/>
+          <a:lstStyle/>
+          <a:p>
+            <a:pPr algn="ctr"/>
+            <a:endParaRPr lang="en-US"/>
+          </a:p>
+        </p:txBody>
+      </p:sp>
+      <p:sp>
+        <p:nvSpPr>
+          <p:cNvPr id="2" name="Titel 1">
+            <a:extLst>
+              <a:ext uri="{FF2B5EF4-FFF2-40B4-BE49-F238E27FC236}">
+                <a16:creationId xmlns:a16="http://schemas.microsoft.com/office/drawing/2014/main" id="{27DC7F6A-3064-6712-B8F7-26E3BE437434}"/>
+              </a:ext>
+            </a:extLst>
+          </p:cNvPr>
+          <p:cNvSpPr>
+            <a:spLocks noGrp="1"/>
+          </p:cNvSpPr>
+          <p:nvPr>
+            <p:ph type="title"/>
+          </p:nvPr>
+        </p:nvSpPr>
+        <p:spPr>
+          <a:xfrm>
+            <a:off x="838200" y="365125"/>
+            <a:ext cx="10515600" cy="1325563"/>
+          </a:xfrm>
+        </p:spPr>
+        <p:txBody>
+          <a:bodyPr>
+            <a:normAutofit/>
+          </a:bodyPr>
+          <a:lstStyle/>
+          <a:p>
+            <a:r>
+              <a:rPr lang="da-DK" sz="4600" dirty="0">
+                <a:solidFill>
+                  <a:srgbClr val="FFFFFF"/>
+                </a:solidFill>
+              </a:rPr>
+              <a:t>Rest </a:t>
+            </a:r>
+            <a:r>
+              <a:rPr lang="da-DK" sz="4600" dirty="0" err="1">
+                <a:solidFill>
+                  <a:srgbClr val="FFFFFF"/>
+                </a:solidFill>
+              </a:rPr>
+              <a:t>api</a:t>
+            </a:r>
+            <a:r>
+              <a:rPr lang="da-DK" sz="4600" dirty="0">
+                <a:solidFill>
+                  <a:srgbClr val="FFFFFF"/>
+                </a:solidFill>
+              </a:rPr>
+              <a:t> solution</a:t>
+            </a:r>
+          </a:p>
+        </p:txBody>
+      </p:sp>
+      <p:sp>
+        <p:nvSpPr>
+          <p:cNvPr id="3" name="Pladsholder til indhold 2">
+            <a:extLst>
+              <a:ext uri="{FF2B5EF4-FFF2-40B4-BE49-F238E27FC236}">
+                <a16:creationId xmlns:a16="http://schemas.microsoft.com/office/drawing/2014/main" id="{7364B8A9-43EA-665A-7052-5CAA16B615D4}"/>
+              </a:ext>
+            </a:extLst>
+          </p:cNvPr>
+          <p:cNvSpPr>
+            <a:spLocks noGrp="1"/>
+          </p:cNvSpPr>
+          <p:nvPr>
+            <p:ph idx="1"/>
+          </p:nvPr>
+        </p:nvSpPr>
+        <p:spPr>
+          <a:xfrm>
+            <a:off x="838200" y="2438400"/>
+            <a:ext cx="10515600" cy="3738562"/>
+          </a:xfrm>
+        </p:spPr>
+        <p:txBody>
+          <a:bodyPr>
+            <a:normAutofit/>
+          </a:bodyPr>
+          <a:lstStyle/>
+          <a:p>
+            <a:r>
+              <a:rPr lang="da-DK" sz="1400" dirty="0"/>
+              <a:t>The rest </a:t>
+            </a:r>
+            <a:r>
+              <a:rPr lang="da-DK" sz="1400" dirty="0" err="1"/>
+              <a:t>api</a:t>
+            </a:r>
+            <a:r>
+              <a:rPr lang="da-DK" sz="1400" dirty="0"/>
+              <a:t> is </a:t>
+            </a:r>
+            <a:r>
+              <a:rPr lang="da-DK" sz="1400" dirty="0" err="1"/>
+              <a:t>implementated</a:t>
+            </a:r>
+            <a:r>
+              <a:rPr lang="da-DK" sz="1400" dirty="0"/>
+              <a:t> as a </a:t>
+            </a:r>
+            <a:r>
+              <a:rPr lang="da-DK" sz="1400" dirty="0" err="1"/>
+              <a:t>docker</a:t>
+            </a:r>
+            <a:r>
+              <a:rPr lang="da-DK" sz="1400" dirty="0"/>
+              <a:t> on .net core with the </a:t>
+            </a:r>
+            <a:r>
+              <a:rPr lang="da-DK" sz="1400" dirty="0" err="1"/>
+              <a:t>following</a:t>
+            </a:r>
+            <a:r>
+              <a:rPr lang="da-DK" sz="1400" dirty="0"/>
+              <a:t> </a:t>
+            </a:r>
+            <a:r>
+              <a:rPr lang="da-DK" sz="1400" dirty="0" err="1"/>
+              <a:t>openId</a:t>
+            </a:r>
+            <a:r>
+              <a:rPr lang="da-DK" sz="1400" dirty="0"/>
+              <a:t> </a:t>
+            </a:r>
+            <a:r>
+              <a:rPr lang="da-DK" sz="1400" dirty="0" err="1"/>
+              <a:t>scopes</a:t>
+            </a:r>
+            <a:r>
+              <a:rPr lang="da-DK" sz="1400" dirty="0"/>
+              <a:t> </a:t>
+            </a:r>
+            <a:r>
+              <a:rPr lang="da-DK" sz="1400" dirty="0" err="1"/>
+              <a:t>talker</a:t>
+            </a:r>
+            <a:r>
+              <a:rPr lang="da-DK" sz="1400" dirty="0"/>
+              <a:t>, participant and administrator. The </a:t>
+            </a:r>
+            <a:r>
+              <a:rPr lang="da-DK" sz="1400" dirty="0" err="1"/>
+              <a:t>brewer</a:t>
+            </a:r>
+            <a:r>
+              <a:rPr lang="da-DK" sz="1400" dirty="0"/>
+              <a:t> and </a:t>
+            </a:r>
+            <a:r>
+              <a:rPr lang="da-DK" sz="1400" dirty="0" err="1"/>
+              <a:t>topic</a:t>
+            </a:r>
+            <a:r>
+              <a:rPr lang="da-DK" sz="1400" dirty="0"/>
+              <a:t> </a:t>
+            </a:r>
+            <a:r>
+              <a:rPr lang="da-DK" sz="1400" dirty="0" err="1"/>
+              <a:t>api</a:t>
+            </a:r>
+            <a:r>
+              <a:rPr lang="da-DK" sz="1400" dirty="0"/>
+              <a:t> </a:t>
+            </a:r>
+            <a:r>
+              <a:rPr lang="da-DK" sz="1400" dirty="0" err="1"/>
+              <a:t>call</a:t>
+            </a:r>
+            <a:r>
+              <a:rPr lang="da-DK" sz="1400" dirty="0"/>
+              <a:t> </a:t>
+            </a:r>
+            <a:r>
+              <a:rPr lang="da-DK" sz="1400" dirty="0" err="1"/>
+              <a:t>could</a:t>
+            </a:r>
+            <a:r>
+              <a:rPr lang="da-DK" sz="1400" dirty="0"/>
+              <a:t> </a:t>
+            </a:r>
+            <a:r>
+              <a:rPr lang="da-DK" sz="1400" dirty="0" err="1"/>
+              <a:t>also</a:t>
+            </a:r>
+            <a:r>
+              <a:rPr lang="da-DK" sz="1400" dirty="0"/>
+              <a:t> </a:t>
+            </a:r>
+            <a:r>
+              <a:rPr lang="da-DK" sz="1400" dirty="0" err="1"/>
+              <a:t>be</a:t>
+            </a:r>
+            <a:r>
+              <a:rPr lang="da-DK" sz="1400" dirty="0"/>
+              <a:t> </a:t>
+            </a:r>
+            <a:r>
+              <a:rPr lang="da-DK" sz="1400" dirty="0" err="1"/>
+              <a:t>orchestrated</a:t>
+            </a:r>
+            <a:r>
+              <a:rPr lang="da-DK" sz="1400" dirty="0"/>
+              <a:t> in a </a:t>
+            </a:r>
+            <a:r>
+              <a:rPr lang="da-DK" sz="1400" dirty="0" err="1"/>
+              <a:t>node.js</a:t>
+            </a:r>
+            <a:r>
+              <a:rPr lang="da-DK" sz="1400" dirty="0"/>
+              <a:t> rest </a:t>
+            </a:r>
+            <a:r>
+              <a:rPr lang="da-DK" sz="1400" dirty="0" err="1"/>
+              <a:t>api</a:t>
+            </a:r>
+            <a:r>
+              <a:rPr lang="da-DK" sz="1400" dirty="0"/>
+              <a:t> </a:t>
+            </a:r>
+            <a:r>
+              <a:rPr lang="da-DK" sz="1400" dirty="0" err="1"/>
+              <a:t>since</a:t>
+            </a:r>
+            <a:r>
+              <a:rPr lang="da-DK" sz="1400" dirty="0"/>
+              <a:t> the </a:t>
+            </a:r>
+            <a:r>
+              <a:rPr lang="da-DK" sz="1400" dirty="0" err="1"/>
+              <a:t>are</a:t>
+            </a:r>
+            <a:r>
+              <a:rPr lang="da-DK" sz="1400" dirty="0"/>
+              <a:t> open but </a:t>
+            </a:r>
+            <a:r>
+              <a:rPr lang="da-DK" sz="1400" dirty="0" err="1"/>
+              <a:t>doing</a:t>
+            </a:r>
+            <a:r>
+              <a:rPr lang="da-DK" sz="1400" dirty="0"/>
+              <a:t> </a:t>
+            </a:r>
+            <a:r>
+              <a:rPr lang="da-DK" sz="1400" dirty="0" err="1"/>
+              <a:t>this</a:t>
+            </a:r>
+            <a:r>
+              <a:rPr lang="da-DK" sz="1400" dirty="0"/>
+              <a:t> </a:t>
+            </a:r>
+            <a:r>
+              <a:rPr lang="da-DK" sz="1400" dirty="0" err="1"/>
+              <a:t>will</a:t>
+            </a:r>
+            <a:r>
+              <a:rPr lang="da-DK" sz="1400" dirty="0"/>
+              <a:t> give a extra </a:t>
+            </a:r>
+            <a:r>
+              <a:rPr lang="da-DK" sz="1400" dirty="0" err="1"/>
+              <a:t>latency</a:t>
+            </a:r>
+            <a:r>
+              <a:rPr lang="da-DK" sz="1400" dirty="0"/>
+              <a:t> </a:t>
+            </a:r>
+            <a:r>
+              <a:rPr lang="da-DK" sz="1400" dirty="0" err="1"/>
+              <a:t>when</a:t>
+            </a:r>
+            <a:r>
+              <a:rPr lang="da-DK" sz="1400" dirty="0"/>
+              <a:t> </a:t>
+            </a:r>
+            <a:r>
+              <a:rPr lang="da-DK" sz="1400" dirty="0" err="1"/>
+              <a:t>calling</a:t>
+            </a:r>
+            <a:r>
+              <a:rPr lang="da-DK" sz="1400" dirty="0"/>
+              <a:t> and extra service. So the tought is </a:t>
+            </a:r>
+            <a:r>
+              <a:rPr lang="da-DK" sz="1400" dirty="0" err="1"/>
+              <a:t>that</a:t>
+            </a:r>
+            <a:r>
+              <a:rPr lang="da-DK" sz="1400" dirty="0"/>
+              <a:t> the administrator </a:t>
+            </a:r>
+            <a:r>
+              <a:rPr lang="da-DK" sz="1400" dirty="0" err="1"/>
+              <a:t>can</a:t>
+            </a:r>
+            <a:r>
+              <a:rPr lang="da-DK" sz="1400" dirty="0"/>
+              <a:t> import venues and </a:t>
+            </a:r>
+            <a:r>
+              <a:rPr lang="da-DK" sz="1400" dirty="0" err="1"/>
+              <a:t>topics</a:t>
+            </a:r>
+            <a:r>
+              <a:rPr lang="da-DK" sz="1400" dirty="0"/>
+              <a:t> from the </a:t>
+            </a:r>
+            <a:r>
+              <a:rPr lang="da-DK" sz="1400" dirty="0" err="1"/>
+              <a:t>api</a:t>
+            </a:r>
+            <a:r>
+              <a:rPr lang="da-DK" sz="1400" dirty="0"/>
+              <a:t> to the database. </a:t>
+            </a:r>
+          </a:p>
+          <a:p>
+            <a:r>
+              <a:rPr lang="da-DK" sz="1400" dirty="0"/>
+              <a:t>The rest </a:t>
+            </a:r>
+            <a:r>
+              <a:rPr lang="da-DK" sz="1400" dirty="0" err="1"/>
+              <a:t>api</a:t>
+            </a:r>
+            <a:r>
+              <a:rPr lang="da-DK" sz="1400" dirty="0"/>
+              <a:t> solution </a:t>
+            </a:r>
+            <a:r>
+              <a:rPr lang="da-DK" sz="1400" dirty="0" err="1"/>
+              <a:t>main</a:t>
+            </a:r>
+            <a:r>
+              <a:rPr lang="da-DK" sz="1400" dirty="0"/>
+              <a:t> </a:t>
+            </a:r>
+            <a:r>
+              <a:rPr lang="da-DK" sz="1400" dirty="0" err="1"/>
+              <a:t>focus</a:t>
+            </a:r>
+            <a:r>
+              <a:rPr lang="da-DK" sz="1400" dirty="0"/>
+              <a:t> on the rest </a:t>
+            </a:r>
+            <a:r>
+              <a:rPr lang="da-DK" sz="1400" dirty="0" err="1"/>
+              <a:t>api</a:t>
+            </a:r>
+            <a:r>
+              <a:rPr lang="da-DK" sz="1400" dirty="0"/>
+              <a:t> it </a:t>
+            </a:r>
+            <a:r>
+              <a:rPr lang="da-DK" sz="1400" dirty="0" err="1"/>
+              <a:t>self</a:t>
+            </a:r>
+            <a:r>
+              <a:rPr lang="da-DK" sz="1400" dirty="0"/>
+              <a:t> with simple set of </a:t>
+            </a:r>
+            <a:r>
+              <a:rPr lang="da-DK" sz="1400" dirty="0" err="1"/>
+              <a:t>endpoints</a:t>
+            </a:r>
+            <a:r>
+              <a:rPr lang="da-DK" sz="1400" dirty="0"/>
+              <a:t>, </a:t>
+            </a:r>
+            <a:r>
+              <a:rPr lang="da-DK" sz="1400" dirty="0" err="1"/>
+              <a:t>its</a:t>
+            </a:r>
+            <a:r>
+              <a:rPr lang="da-DK" sz="1400" dirty="0"/>
+              <a:t> not a </a:t>
+            </a:r>
+            <a:r>
+              <a:rPr lang="da-DK" sz="1400" dirty="0" err="1"/>
+              <a:t>fully</a:t>
+            </a:r>
+            <a:r>
+              <a:rPr lang="da-DK" sz="1400" dirty="0"/>
+              <a:t> </a:t>
+            </a:r>
+            <a:r>
+              <a:rPr lang="da-DK" sz="1400" dirty="0" err="1"/>
+              <a:t>designed</a:t>
+            </a:r>
+            <a:r>
+              <a:rPr lang="da-DK" sz="1400" dirty="0"/>
+              <a:t> rest </a:t>
+            </a:r>
+            <a:r>
+              <a:rPr lang="da-DK" sz="1400" dirty="0" err="1"/>
+              <a:t>api</a:t>
+            </a:r>
+            <a:r>
+              <a:rPr lang="da-DK" sz="1400" dirty="0"/>
+              <a:t> to support all </a:t>
+            </a:r>
+            <a:r>
+              <a:rPr lang="da-DK" sz="1400" dirty="0" err="1"/>
+              <a:t>call</a:t>
+            </a:r>
+            <a:r>
+              <a:rPr lang="da-DK" sz="1400" dirty="0"/>
+              <a:t> from the </a:t>
+            </a:r>
+            <a:r>
+              <a:rPr lang="da-DK" sz="1400" dirty="0" err="1"/>
+              <a:t>react</a:t>
+            </a:r>
+            <a:r>
+              <a:rPr lang="da-DK" sz="1400" dirty="0"/>
+              <a:t> </a:t>
+            </a:r>
+            <a:r>
+              <a:rPr lang="da-DK" sz="1400" dirty="0" err="1"/>
+              <a:t>frontend</a:t>
+            </a:r>
+            <a:r>
+              <a:rPr lang="da-DK" sz="1400" dirty="0"/>
+              <a:t>. </a:t>
+            </a:r>
+          </a:p>
+          <a:p>
+            <a:r>
+              <a:rPr lang="da-DK" sz="1400" dirty="0"/>
+              <a:t>The Repository </a:t>
+            </a:r>
+            <a:r>
+              <a:rPr lang="da-DK" sz="1400" dirty="0" err="1"/>
+              <a:t>are</a:t>
+            </a:r>
+            <a:r>
+              <a:rPr lang="da-DK" sz="1400" dirty="0"/>
+              <a:t> </a:t>
+            </a:r>
+            <a:r>
+              <a:rPr lang="da-DK" sz="1400" dirty="0" err="1"/>
+              <a:t>mocked</a:t>
+            </a:r>
+            <a:r>
+              <a:rPr lang="da-DK" sz="1400" dirty="0"/>
+              <a:t> with dummy data end no database is hooked up in the solution. </a:t>
+            </a:r>
+          </a:p>
+          <a:p>
+            <a:pPr marL="0" indent="0">
+              <a:buNone/>
+            </a:pPr>
+            <a:endParaRPr lang="da-DK" sz="1400" dirty="0"/>
+          </a:p>
+          <a:p>
+            <a:pPr marL="0" indent="0">
+              <a:buNone/>
+            </a:pPr>
+            <a:endParaRPr lang="da-DK" sz="1400" dirty="0"/>
+          </a:p>
+          <a:p>
+            <a:endParaRPr lang="da-DK" sz="1400" dirty="0"/>
+          </a:p>
+          <a:p>
+            <a:endParaRPr lang="da-DK" sz="1400" dirty="0"/>
+          </a:p>
+          <a:p>
+            <a:pPr marL="0" indent="0">
+              <a:buNone/>
+            </a:pPr>
+            <a:endParaRPr lang="da-DK" sz="1400" dirty="0"/>
+          </a:p>
+          <a:p>
+            <a:pPr marL="0" indent="0">
+              <a:buNone/>
+            </a:pPr>
+            <a:endParaRPr lang="da-DK" sz="1400" dirty="0"/>
+          </a:p>
+          <a:p>
+            <a:endParaRPr lang="da-DK" sz="1400" dirty="0"/>
+          </a:p>
+          <a:p>
+            <a:pPr lvl="1"/>
+            <a:endParaRPr lang="da-DK" sz="1000" dirty="0"/>
+          </a:p>
+          <a:p>
+            <a:pPr lvl="1"/>
+            <a:endParaRPr lang="da-DK" sz="800" dirty="0"/>
+          </a:p>
+        </p:txBody>
+      </p:sp>
+    </p:spTree>
+    <p:extLst>
+      <p:ext uri="{BB962C8B-B14F-4D97-AF65-F5344CB8AC3E}">
+        <p14:creationId xmlns:p14="http://schemas.microsoft.com/office/powerpoint/2010/main" val="1607170623"/>
+      </p:ext>
+    </p:extLst>
+  </p:cSld>
+  <p:clrMapOvr>
+    <a:masterClrMapping/>
+  </p:clrMapOvr>
+</p:sld>
+</file>
+
+<file path=ppt/slides/slide12.xml><?xml version="1.0" encoding="utf-8"?>
+<p:sld xmlns:a="http://schemas.openxmlformats.org/drawingml/2006/main" xmlns:r="http://schemas.openxmlformats.org/officeDocument/2006/relationships" xmlns:p="http://schemas.openxmlformats.org/presentationml/2006/main">
+  <p:cSld>
+    <p:bg>
+      <p:bgPr>
+        <a:solidFill>
+          <a:schemeClr val="bg1"/>
+        </a:solidFill>
+        <a:effectLst/>
+      </p:bgPr>
+    </p:bg>
+    <p:spTree>
+      <p:nvGrpSpPr>
+        <p:cNvPr id="1" name=""/>
+        <p:cNvGrpSpPr/>
+        <p:nvPr/>
+      </p:nvGrpSpPr>
+      <p:grpSpPr>
+        <a:xfrm>
+          <a:off x="0" y="0"/>
+          <a:ext cx="0" cy="0"/>
+          <a:chOff x="0" y="0"/>
+          <a:chExt cx="0" cy="0"/>
+        </a:xfrm>
+      </p:grpSpPr>
+      <p:sp>
+        <p:nvSpPr>
+          <p:cNvPr id="8" name="Rectangle 7">
+            <a:extLst>
+              <a:ext uri="{FF2B5EF4-FFF2-40B4-BE49-F238E27FC236}">
+                <a16:creationId xmlns:a16="http://schemas.microsoft.com/office/drawing/2014/main" id="{DE7FFD28-545C-4C88-A2E7-152FB234C92C}"/>
+              </a:ext>
+              <a:ext uri="{C183D7F6-B498-43B3-948B-1728B52AA6E4}">
+                <adec:decorative xmlns:adec="http://schemas.microsoft.com/office/drawing/2017/decorative" val="1"/>
+              </a:ext>
+            </a:extLst>
+          </p:cNvPr>
+          <p:cNvSpPr>
+            <a:spLocks noGrp="1" noRot="1" noChangeAspect="1" noMove="1" noResize="1" noEditPoints="1" noAdjustHandles="1" noChangeArrowheads="1" noChangeShapeType="1" noTextEdit="1"/>
+          </p:cNvSpPr>
+          <p:nvPr>
+            <p:extLst>
+              <p:ext uri="{386F3935-93C4-4BCD-93E2-E3B085C9AB24}">
+                <p16:designElem xmlns:p16="http://schemas.microsoft.com/office/powerpoint/2015/main" val="1"/>
+              </p:ext>
+            </p:extLst>
+          </p:nvPr>
+        </p:nvSpPr>
+        <p:spPr>
+          <a:xfrm>
+            <a:off x="0" y="0"/>
+            <a:ext cx="12192000" cy="1911350"/>
+          </a:xfrm>
+          <a:prstGeom prst="rect">
+            <a:avLst/>
+          </a:prstGeom>
+          <a:solidFill>
+            <a:schemeClr val="accent5"/>
+          </a:solidFill>
+          <a:ln>
+            <a:noFill/>
+          </a:ln>
+        </p:spPr>
+        <p:style>
+          <a:lnRef idx="2">
+            <a:schemeClr val="accent1">
+              <a:shade val="50000"/>
+            </a:schemeClr>
+          </a:lnRef>
+          <a:fillRef idx="1">
+            <a:schemeClr val="accent1"/>
+          </a:fillRef>
+          <a:effectRef idx="0">
+            <a:schemeClr val="accent1"/>
+          </a:effectRef>
+          <a:fontRef idx="minor">
+            <a:schemeClr val="lt1"/>
+          </a:fontRef>
+        </p:style>
+        <p:txBody>
+          <a:bodyPr rtlCol="0" anchor="ctr"/>
+          <a:lstStyle/>
+          <a:p>
+            <a:pPr algn="ctr"/>
+            <a:endParaRPr lang="en-US"/>
+          </a:p>
+        </p:txBody>
+      </p:sp>
+      <p:sp>
+        <p:nvSpPr>
+          <p:cNvPr id="2" name="Titel 1">
+            <a:extLst>
+              <a:ext uri="{FF2B5EF4-FFF2-40B4-BE49-F238E27FC236}">
+                <a16:creationId xmlns:a16="http://schemas.microsoft.com/office/drawing/2014/main" id="{27DC7F6A-3064-6712-B8F7-26E3BE437434}"/>
+              </a:ext>
+            </a:extLst>
+          </p:cNvPr>
+          <p:cNvSpPr>
+            <a:spLocks noGrp="1"/>
+          </p:cNvSpPr>
+          <p:nvPr>
+            <p:ph type="title"/>
+          </p:nvPr>
+        </p:nvSpPr>
+        <p:spPr>
+          <a:xfrm>
+            <a:off x="838200" y="365125"/>
+            <a:ext cx="10515600" cy="1325563"/>
+          </a:xfrm>
+        </p:spPr>
+        <p:txBody>
+          <a:bodyPr>
+            <a:normAutofit/>
+          </a:bodyPr>
+          <a:lstStyle/>
+          <a:p>
+            <a:r>
               <a:rPr lang="da-DK" sz="4600" dirty="0" err="1">
                 <a:solidFill>
                   <a:srgbClr val="FFFFFF"/>
@@ -5407,12 +7094,12 @@
           <a:lstStyle/>
           <a:p>
             <a:r>
-              <a:rPr lang="da-DK" sz="4600">
+              <a:rPr lang="da-DK" sz="4600" dirty="0">
                 <a:solidFill>
                   <a:srgbClr val="FFFFFF"/>
                 </a:solidFill>
               </a:rPr>
-              <a:t>Overview of solution</a:t>
+              <a:t>Overview of solution in c4</a:t>
             </a:r>
           </a:p>
         </p:txBody>
@@ -5448,20 +7135,7 @@
             <a:pPr marL="0" indent="0">
               <a:buNone/>
             </a:pPr>
-            <a:r>
-              <a:rPr lang="da-DK" sz="1400" dirty="0"/>
-              <a:t>Q4 Diagram at </a:t>
-            </a:r>
-            <a:r>
-              <a:rPr lang="da-DK" sz="1400" dirty="0">
-                <a:hlinkClick r:id="rId3"/>
-              </a:rPr>
-              <a:t>url</a:t>
-            </a:r>
-            <a:r>
-              <a:rPr lang="da-DK" sz="1400" dirty="0"/>
-              <a:t> </a:t>
-            </a:r>
+            <a:endParaRPr lang="da-DK" sz="1400" dirty="0"/>
           </a:p>
           <a:p>
             <a:pPr marL="0" indent="0">
@@ -5469,14 +7143,38 @@
             </a:pPr>
             <a:endParaRPr lang="da-DK" sz="1400" dirty="0"/>
           </a:p>
-          <a:p>
-            <a:pPr marL="0" indent="0">
-              <a:buNone/>
-            </a:pPr>
-            <a:endParaRPr lang="da-DK" sz="1400" dirty="0"/>
-          </a:p>
-        </p:txBody>
-      </p:sp>
+        </p:txBody>
+      </p:sp>
+      <p:pic>
+        <p:nvPicPr>
+          <p:cNvPr id="4" name="Billede 3">
+            <a:extLst>
+              <a:ext uri="{FF2B5EF4-FFF2-40B4-BE49-F238E27FC236}">
+                <a16:creationId xmlns:a16="http://schemas.microsoft.com/office/drawing/2014/main" id="{B58552BE-2940-2930-8E10-0DFF4724B78B}"/>
+              </a:ext>
+            </a:extLst>
+          </p:cNvPr>
+          <p:cNvPicPr>
+            <a:picLocks noChangeAspect="1"/>
+          </p:cNvPicPr>
+          <p:nvPr/>
+        </p:nvPicPr>
+        <p:blipFill>
+          <a:blip r:embed="rId3"/>
+          <a:stretch>
+            <a:fillRect/>
+          </a:stretch>
+        </p:blipFill>
+        <p:spPr>
+          <a:xfrm>
+            <a:off x="1147119" y="2044908"/>
+            <a:ext cx="5364892" cy="4525546"/>
+          </a:xfrm>
+          <a:prstGeom prst="rect">
+            <a:avLst/>
+          </a:prstGeom>
+        </p:spPr>
+      </p:pic>
     </p:spTree>
     <p:extLst>
       <p:ext uri="{BB962C8B-B14F-4D97-AF65-F5344CB8AC3E}">
@@ -5517,10 +7215,10 @@
       </p:grpSpPr>
       <p:sp>
         <p:nvSpPr>
-          <p:cNvPr id="9" name="Rectangle 8">
-            <a:extLst>
-              <a:ext uri="{FF2B5EF4-FFF2-40B4-BE49-F238E27FC236}">
-                <a16:creationId xmlns:a16="http://schemas.microsoft.com/office/drawing/2014/main" id="{EBF87945-A001-489F-9D9B-7D9435F0B9CA}"/>
+          <p:cNvPr id="13" name="Rectangle 12">
+            <a:extLst>
+              <a:ext uri="{FF2B5EF4-FFF2-40B4-BE49-F238E27FC236}">
+                <a16:creationId xmlns:a16="http://schemas.microsoft.com/office/drawing/2014/main" id="{DE7FFD28-545C-4C88-A2E7-152FB234C92C}"/>
               </a:ext>
               <a:ext uri="{C183D7F6-B498-43B3-948B-1728B52AA6E4}">
                 <adec:decorative xmlns:adec="http://schemas.microsoft.com/office/drawing/2017/decorative" val="1"/>
@@ -5540,8 +7238,8 @@
         </p:nvSpPr>
         <p:spPr>
           <a:xfrm>
-            <a:off x="548639" y="347471"/>
-            <a:ext cx="11100816" cy="1801368"/>
+            <a:off x="0" y="0"/>
+            <a:ext cx="12192000" cy="1911350"/>
           </a:xfrm>
           <a:prstGeom prst="rect">
             <a:avLst/>
@@ -5596,7 +7294,7 @@
         </p:nvSpPr>
         <p:spPr>
           <a:xfrm>
-            <a:off x="838200" y="585216"/>
+            <a:off x="838200" y="365125"/>
             <a:ext cx="10515600" cy="1325563"/>
           </a:xfrm>
         </p:spPr>
@@ -5607,22 +7305,63 @@
           <a:lstStyle/>
           <a:p>
             <a:r>
-              <a:rPr lang="da-DK">
+              <a:rPr lang="da-DK" sz="4600" dirty="0">
                 <a:solidFill>
                   <a:srgbClr val="FFFFFF"/>
                 </a:solidFill>
               </a:rPr>
-              <a:t>Infrastucture solution</a:t>
-            </a:r>
+              <a:t>Overview of solution in c4</a:t>
+            </a:r>
+          </a:p>
+        </p:txBody>
+      </p:sp>
+      <p:sp>
+        <p:nvSpPr>
+          <p:cNvPr id="3" name="Pladsholder til indhold 2">
+            <a:extLst>
+              <a:ext uri="{FF2B5EF4-FFF2-40B4-BE49-F238E27FC236}">
+                <a16:creationId xmlns:a16="http://schemas.microsoft.com/office/drawing/2014/main" id="{7364B8A9-43EA-665A-7052-5CAA16B615D4}"/>
+              </a:ext>
+            </a:extLst>
+          </p:cNvPr>
+          <p:cNvSpPr>
+            <a:spLocks noGrp="1"/>
+          </p:cNvSpPr>
+          <p:nvPr>
+            <p:ph idx="1"/>
+          </p:nvPr>
+        </p:nvSpPr>
+        <p:spPr>
+          <a:xfrm>
+            <a:off x="838200" y="2438400"/>
+            <a:ext cx="10515600" cy="3738562"/>
+          </a:xfrm>
+        </p:spPr>
+        <p:txBody>
+          <a:bodyPr>
+            <a:normAutofit/>
+          </a:bodyPr>
+          <a:lstStyle/>
+          <a:p>
+            <a:pPr marL="0" indent="0">
+              <a:buNone/>
+            </a:pPr>
+            <a:endParaRPr lang="da-DK" sz="1400" dirty="0"/>
+          </a:p>
+          <a:p>
+            <a:pPr marL="0" indent="0">
+              <a:buNone/>
+            </a:pPr>
+            <a:endParaRPr lang="da-DK" sz="1400" dirty="0"/>
           </a:p>
         </p:txBody>
       </p:sp>
       <p:pic>
         <p:nvPicPr>
-          <p:cNvPr id="4" name="Billede 3">
-            <a:extLst>
-              <a:ext uri="{FF2B5EF4-FFF2-40B4-BE49-F238E27FC236}">
-                <a16:creationId xmlns:a16="http://schemas.microsoft.com/office/drawing/2014/main" id="{959A9389-291D-087A-F4FC-EBAADAD36D00}"/>
+          <p:cNvPr id="6" name="Billede 5">
+            <a:extLst>
+              <a:ext uri="{FF2B5EF4-FFF2-40B4-BE49-F238E27FC236}">
+                <a16:creationId xmlns:a16="http://schemas.microsoft.com/office/drawing/2014/main" id="{9BAB0C85-57A5-0717-2A94-C0C66FFA1551}"/>
               </a:ext>
             </a:extLst>
           </p:cNvPr>
@@ -5631,64 +7370,26 @@
           </p:cNvPicPr>
           <p:nvPr/>
         </p:nvPicPr>
-        <p:blipFill rotWithShape="1">
-          <a:blip r:embed="rId2"/>
-          <a:srcRect t="7205" r="3" b="3"/>
-          <a:stretch/>
+        <p:blipFill>
+          <a:blip r:embed="rId3"/>
+          <a:stretch>
+            <a:fillRect/>
+          </a:stretch>
         </p:blipFill>
         <p:spPr>
           <a:xfrm>
-            <a:off x="841248" y="2516777"/>
-            <a:ext cx="6236208" cy="3660185"/>
+            <a:off x="490223" y="2055813"/>
+            <a:ext cx="6832696" cy="4584424"/>
           </a:xfrm>
           <a:prstGeom prst="rect">
             <a:avLst/>
           </a:prstGeom>
         </p:spPr>
       </p:pic>
-      <p:sp>
-        <p:nvSpPr>
-          <p:cNvPr id="3" name="Pladsholder til indhold 2">
-            <a:extLst>
-              <a:ext uri="{FF2B5EF4-FFF2-40B4-BE49-F238E27FC236}">
-                <a16:creationId xmlns:a16="http://schemas.microsoft.com/office/drawing/2014/main" id="{7364B8A9-43EA-665A-7052-5CAA16B615D4}"/>
-              </a:ext>
-            </a:extLst>
-          </p:cNvPr>
-          <p:cNvSpPr>
-            <a:spLocks noGrp="1"/>
-          </p:cNvSpPr>
-          <p:nvPr>
-            <p:ph idx="1"/>
-          </p:nvPr>
-        </p:nvSpPr>
-        <p:spPr>
-          <a:xfrm>
-            <a:off x="7546848" y="2516777"/>
-            <a:ext cx="3803904" cy="3660185"/>
-          </a:xfrm>
-        </p:spPr>
-        <p:txBody>
-          <a:bodyPr anchor="ctr">
-            <a:normAutofit/>
-          </a:bodyPr>
-          <a:lstStyle/>
-          <a:p>
-            <a:pPr marL="457200" lvl="1" indent="0">
-              <a:buNone/>
-            </a:pPr>
-            <a:endParaRPr lang="da-DK" sz="2200"/>
-          </a:p>
-          <a:p>
-            <a:pPr lvl="1"/>
-            <a:endParaRPr lang="da-DK" sz="2200"/>
-          </a:p>
-        </p:txBody>
-      </p:sp>
     </p:spTree>
     <p:extLst>
       <p:ext uri="{BB962C8B-B14F-4D97-AF65-F5344CB8AC3E}">
-        <p14:creationId xmlns:p14="http://schemas.microsoft.com/office/powerpoint/2010/main" val="48160818"/>
+        <p14:creationId xmlns:p14="http://schemas.microsoft.com/office/powerpoint/2010/main" val="2044207046"/>
       </p:ext>
     </p:extLst>
   </p:cSld>
@@ -5725,7 +7426,7 @@
       </p:grpSpPr>
       <p:sp>
         <p:nvSpPr>
-          <p:cNvPr id="8" name="Rectangle 7">
+          <p:cNvPr id="13" name="Rectangle 12">
             <a:extLst>
               <a:ext uri="{FF2B5EF4-FFF2-40B4-BE49-F238E27FC236}">
                 <a16:creationId xmlns:a16="http://schemas.microsoft.com/office/drawing/2014/main" id="{DE7FFD28-545C-4C88-A2E7-152FB234C92C}"/>
@@ -5815,20 +7516,12 @@
           <a:lstStyle/>
           <a:p>
             <a:r>
-              <a:rPr lang="da-DK" sz="4600" dirty="0" err="1">
-                <a:solidFill>
-                  <a:srgbClr val="FFFFFF"/>
-                </a:solidFill>
-              </a:rPr>
-              <a:t>Infrastucture</a:t>
-            </a:r>
-            <a:r>
               <a:rPr lang="da-DK" sz="4600" dirty="0">
                 <a:solidFill>
                   <a:srgbClr val="FFFFFF"/>
                 </a:solidFill>
               </a:rPr>
-              <a:t> solution</a:t>
+              <a:t>Overview of solution in c4</a:t>
             </a:r>
           </a:p>
         </p:txBody>
@@ -5857,39 +7550,9 @@
         </p:spPr>
         <p:txBody>
           <a:bodyPr>
-            <a:noAutofit/>
+            <a:normAutofit/>
           </a:bodyPr>
           <a:lstStyle/>
-          <a:p>
-            <a:r>
-              <a:rPr lang="da-DK" sz="1400" dirty="0"/>
-              <a:t>The solution is base </a:t>
-            </a:r>
-            <a:r>
-              <a:rPr lang="da-DK" sz="1400" dirty="0" err="1"/>
-              <a:t>consists</a:t>
-            </a:r>
-            <a:r>
-              <a:rPr lang="da-DK" sz="1400" dirty="0"/>
-              <a:t> of </a:t>
-            </a:r>
-            <a:r>
-              <a:rPr lang="da-DK" sz="1400" dirty="0" err="1"/>
-              <a:t>four</a:t>
-            </a:r>
-            <a:r>
-              <a:rPr lang="da-DK" sz="1400" dirty="0"/>
-              <a:t> </a:t>
-            </a:r>
-            <a:r>
-              <a:rPr lang="da-DK" sz="1400" dirty="0" err="1"/>
-              <a:t>main</a:t>
-            </a:r>
-            <a:r>
-              <a:rPr lang="da-DK" sz="1400" dirty="0"/>
-              <a:t> components</a:t>
-            </a:r>
-          </a:p>
           <a:p>
             <a:pPr marL="0" indent="0">
               <a:buNone/>
@@ -5897,428 +7560,47 @@
             <a:endParaRPr lang="da-DK" sz="1400" dirty="0"/>
           </a:p>
           <a:p>
-            <a:pPr lvl="1"/>
-            <a:r>
-              <a:rPr lang="da-DK" sz="1400" dirty="0" err="1"/>
-              <a:t>Frontend</a:t>
-            </a:r>
-            <a:r>
-              <a:rPr lang="da-DK" sz="1400" dirty="0"/>
-              <a:t> </a:t>
-            </a:r>
-            <a:r>
-              <a:rPr lang="da-DK" sz="1400" dirty="0" err="1"/>
-              <a:t>that</a:t>
-            </a:r>
-            <a:r>
-              <a:rPr lang="da-DK" sz="1400" dirty="0"/>
-              <a:t> </a:t>
-            </a:r>
-            <a:r>
-              <a:rPr lang="da-DK" sz="1400" dirty="0" err="1"/>
-              <a:t>implements</a:t>
-            </a:r>
-            <a:r>
-              <a:rPr lang="da-DK" sz="1400" dirty="0"/>
-              <a:t> a </a:t>
-            </a:r>
-            <a:r>
-              <a:rPr lang="da-DK" sz="1400" dirty="0" err="1"/>
-              <a:t>Waf</a:t>
-            </a:r>
-            <a:r>
-              <a:rPr lang="da-DK" sz="1400" dirty="0"/>
-              <a:t>, </a:t>
-            </a:r>
-            <a:r>
-              <a:rPr lang="da-DK" sz="1400" dirty="0" err="1"/>
-              <a:t>application</a:t>
-            </a:r>
-            <a:r>
-              <a:rPr lang="da-DK" sz="1400" dirty="0"/>
-              <a:t> </a:t>
-            </a:r>
-            <a:r>
-              <a:rPr lang="da-DK" sz="1400" dirty="0" err="1"/>
-              <a:t>loadbalancer</a:t>
-            </a:r>
-            <a:r>
-              <a:rPr lang="da-DK" sz="1400" dirty="0"/>
-              <a:t> and </a:t>
-            </a:r>
-            <a:r>
-              <a:rPr lang="da-DK" sz="1400" dirty="0" err="1"/>
-              <a:t>ecs</a:t>
-            </a:r>
-            <a:r>
-              <a:rPr lang="da-DK" sz="1400" dirty="0"/>
-              <a:t> service.</a:t>
-            </a:r>
-          </a:p>
-          <a:p>
-            <a:pPr lvl="2"/>
-            <a:r>
-              <a:rPr lang="da-DK" sz="1400" dirty="0"/>
-              <a:t>Security </a:t>
-            </a:r>
-            <a:r>
-              <a:rPr lang="da-DK" sz="1400" dirty="0" err="1"/>
-              <a:t>groups</a:t>
-            </a:r>
-            <a:r>
-              <a:rPr lang="da-DK" sz="1400" dirty="0"/>
-              <a:t> </a:t>
-            </a:r>
-            <a:r>
-              <a:rPr lang="da-DK" sz="1400" dirty="0" err="1"/>
-              <a:t>that</a:t>
-            </a:r>
-            <a:r>
-              <a:rPr lang="da-DK" sz="1400" dirty="0"/>
-              <a:t> </a:t>
-            </a:r>
-            <a:r>
-              <a:rPr lang="da-DK" sz="1400" dirty="0" err="1"/>
-              <a:t>resticts</a:t>
-            </a:r>
-            <a:r>
-              <a:rPr lang="da-DK" sz="1400" dirty="0"/>
-              <a:t> </a:t>
-            </a:r>
-            <a:r>
-              <a:rPr lang="da-DK" sz="1400" dirty="0" err="1"/>
-              <a:t>only</a:t>
-            </a:r>
-            <a:r>
-              <a:rPr lang="da-DK" sz="1400" dirty="0"/>
-              <a:t> </a:t>
-            </a:r>
-            <a:r>
-              <a:rPr lang="da-DK" sz="1400" dirty="0" err="1"/>
-              <a:t>traffic</a:t>
-            </a:r>
-            <a:r>
-              <a:rPr lang="da-DK" sz="1400" dirty="0"/>
-              <a:t> of </a:t>
-            </a:r>
-            <a:r>
-              <a:rPr lang="da-DK" sz="1400" dirty="0" err="1"/>
-              <a:t>https</a:t>
-            </a:r>
-            <a:r>
-              <a:rPr lang="da-DK" sz="1400" dirty="0"/>
-              <a:t> </a:t>
-            </a:r>
-            <a:r>
-              <a:rPr lang="da-DK" sz="1400" dirty="0" err="1"/>
-              <a:t>between</a:t>
-            </a:r>
-            <a:r>
-              <a:rPr lang="da-DK" sz="1400" dirty="0"/>
-              <a:t> WAF, ALB, </a:t>
-            </a:r>
-            <a:r>
-              <a:rPr lang="da-DK" sz="1400" dirty="0" err="1"/>
-              <a:t>ecs</a:t>
-            </a:r>
-            <a:r>
-              <a:rPr lang="da-DK" sz="1400" dirty="0"/>
-              <a:t> service and </a:t>
-            </a:r>
-            <a:r>
-              <a:rPr lang="da-DK" sz="1400" dirty="0" err="1"/>
-              <a:t>outbound</a:t>
-            </a:r>
-            <a:r>
-              <a:rPr lang="da-DK" sz="1400" dirty="0"/>
-              <a:t> </a:t>
-            </a:r>
-            <a:r>
-              <a:rPr lang="da-DK" sz="1400" dirty="0" err="1"/>
-              <a:t>traffic</a:t>
-            </a:r>
-            <a:r>
-              <a:rPr lang="da-DK" sz="1400" dirty="0"/>
-              <a:t> to </a:t>
-            </a:r>
-            <a:r>
-              <a:rPr lang="da-DK" sz="1400" dirty="0" err="1"/>
-              <a:t>client</a:t>
-            </a:r>
-            <a:r>
-              <a:rPr lang="da-DK" sz="1400" dirty="0"/>
-              <a:t> and </a:t>
-            </a:r>
-            <a:r>
-              <a:rPr lang="da-DK" sz="1400" dirty="0" err="1"/>
-              <a:t>openid</a:t>
-            </a:r>
-            <a:r>
-              <a:rPr lang="da-DK" sz="1400" dirty="0"/>
-              <a:t> </a:t>
-            </a:r>
-            <a:r>
-              <a:rPr lang="da-DK" sz="1400" dirty="0" err="1"/>
-              <a:t>provider</a:t>
-            </a:r>
-            <a:r>
-              <a:rPr lang="da-DK" sz="1400" dirty="0"/>
-              <a:t>. If the </a:t>
-            </a:r>
-            <a:r>
-              <a:rPr lang="da-DK" sz="1400" dirty="0" err="1"/>
-              <a:t>openid</a:t>
-            </a:r>
-            <a:r>
-              <a:rPr lang="da-DK" sz="1400" dirty="0"/>
-              <a:t> </a:t>
-            </a:r>
-            <a:r>
-              <a:rPr lang="da-DK" sz="1400" dirty="0" err="1"/>
-              <a:t>provider</a:t>
-            </a:r>
-            <a:r>
-              <a:rPr lang="da-DK" sz="1400" dirty="0"/>
-              <a:t> is </a:t>
-            </a:r>
-            <a:r>
-              <a:rPr lang="da-DK" sz="1400" dirty="0" err="1"/>
-              <a:t>inside</a:t>
-            </a:r>
-            <a:r>
-              <a:rPr lang="da-DK" sz="1400" dirty="0"/>
-              <a:t> </a:t>
-            </a:r>
-          </a:p>
-          <a:p>
-            <a:pPr lvl="2"/>
-            <a:r>
-              <a:rPr lang="da-DK" sz="1400" dirty="0" err="1"/>
-              <a:t>Secutity</a:t>
-            </a:r>
-            <a:r>
-              <a:rPr lang="da-DK" sz="1400" dirty="0"/>
-              <a:t> </a:t>
-            </a:r>
-            <a:r>
-              <a:rPr lang="da-DK" sz="1400" dirty="0" err="1"/>
-              <a:t>group</a:t>
-            </a:r>
-            <a:r>
-              <a:rPr lang="da-DK" sz="1400" dirty="0"/>
-              <a:t> </a:t>
-            </a:r>
-            <a:r>
-              <a:rPr lang="da-DK" sz="1400" dirty="0" err="1"/>
-              <a:t>that</a:t>
-            </a:r>
-            <a:r>
-              <a:rPr lang="da-DK" sz="1400" dirty="0"/>
-              <a:t> </a:t>
-            </a:r>
-            <a:r>
-              <a:rPr lang="da-DK" sz="1400" dirty="0" err="1"/>
-              <a:t>allows</a:t>
-            </a:r>
-            <a:r>
-              <a:rPr lang="da-DK" sz="1400" dirty="0"/>
-              <a:t> </a:t>
-            </a:r>
-            <a:r>
-              <a:rPr lang="da-DK" sz="1400" dirty="0" err="1"/>
-              <a:t>ecs</a:t>
-            </a:r>
-            <a:r>
-              <a:rPr lang="da-DK" sz="1400" dirty="0"/>
-              <a:t> service to </a:t>
-            </a:r>
-            <a:r>
-              <a:rPr lang="da-DK" sz="1400" dirty="0" err="1"/>
-              <a:t>call</a:t>
-            </a:r>
-            <a:r>
-              <a:rPr lang="da-DK" sz="1400" dirty="0"/>
-              <a:t> RDS</a:t>
-            </a:r>
-          </a:p>
-          <a:p>
-            <a:pPr lvl="2"/>
-            <a:r>
-              <a:rPr lang="da-DK" sz="1400" dirty="0"/>
-              <a:t>IAM </a:t>
-            </a:r>
-            <a:r>
-              <a:rPr lang="da-DK" sz="1400" dirty="0" err="1"/>
-              <a:t>roles</a:t>
-            </a:r>
-            <a:r>
-              <a:rPr lang="da-DK" sz="1400" dirty="0"/>
-              <a:t> </a:t>
-            </a:r>
-            <a:r>
-              <a:rPr lang="da-DK" sz="1400" dirty="0" err="1"/>
-              <a:t>that</a:t>
-            </a:r>
-            <a:r>
-              <a:rPr lang="da-DK" sz="1400" dirty="0"/>
-              <a:t> </a:t>
-            </a:r>
-            <a:r>
-              <a:rPr lang="da-DK" sz="1400" dirty="0" err="1"/>
-              <a:t>lock</a:t>
-            </a:r>
-            <a:r>
-              <a:rPr lang="da-DK" sz="1400" dirty="0"/>
-              <a:t> </a:t>
-            </a:r>
-            <a:r>
-              <a:rPr lang="da-DK" sz="1400" dirty="0" err="1"/>
-              <a:t>down</a:t>
-            </a:r>
-            <a:r>
-              <a:rPr lang="da-DK" sz="1400" dirty="0"/>
-              <a:t> </a:t>
-            </a:r>
-            <a:r>
-              <a:rPr lang="da-DK" sz="1400" dirty="0" err="1"/>
-              <a:t>access</a:t>
-            </a:r>
-            <a:r>
-              <a:rPr lang="da-DK" sz="1400" dirty="0"/>
-              <a:t> to </a:t>
-            </a:r>
-            <a:r>
-              <a:rPr lang="da-DK" sz="1400" dirty="0" err="1"/>
-              <a:t>only</a:t>
-            </a:r>
-            <a:r>
-              <a:rPr lang="da-DK" sz="1400" dirty="0"/>
-              <a:t> the </a:t>
-            </a:r>
-            <a:r>
-              <a:rPr lang="da-DK" sz="1400" dirty="0" err="1"/>
-              <a:t>resources</a:t>
-            </a:r>
-            <a:r>
-              <a:rPr lang="da-DK" sz="1400" dirty="0"/>
-              <a:t> </a:t>
-            </a:r>
-            <a:r>
-              <a:rPr lang="da-DK" sz="1400" dirty="0" err="1"/>
-              <a:t>that</a:t>
-            </a:r>
-            <a:r>
-              <a:rPr lang="da-DK" sz="1400" dirty="0"/>
-              <a:t> </a:t>
-            </a:r>
-            <a:r>
-              <a:rPr lang="da-DK" sz="1400" dirty="0" err="1"/>
-              <a:t>should</a:t>
-            </a:r>
-            <a:r>
-              <a:rPr lang="da-DK" sz="1400" dirty="0"/>
-              <a:t> </a:t>
-            </a:r>
-            <a:r>
-              <a:rPr lang="da-DK" sz="1400" dirty="0" err="1"/>
-              <a:t>be</a:t>
-            </a:r>
-            <a:r>
-              <a:rPr lang="da-DK" sz="1400" dirty="0"/>
-              <a:t> </a:t>
-            </a:r>
-            <a:r>
-              <a:rPr lang="da-DK" sz="1400" dirty="0" err="1"/>
-              <a:t>accessed</a:t>
-            </a:r>
-            <a:r>
-              <a:rPr lang="da-DK" sz="1400" dirty="0"/>
-              <a:t>.</a:t>
-            </a:r>
-          </a:p>
-          <a:p>
-            <a:pPr lvl="2"/>
-            <a:r>
-              <a:rPr lang="da-DK" sz="1400" dirty="0" err="1"/>
-              <a:t>Autoscaling</a:t>
-            </a:r>
-            <a:r>
-              <a:rPr lang="da-DK" sz="1400" dirty="0"/>
-              <a:t> on cpu / </a:t>
-            </a:r>
-            <a:r>
-              <a:rPr lang="da-DK" sz="1400" dirty="0" err="1"/>
-              <a:t>mem</a:t>
-            </a:r>
-            <a:endParaRPr lang="da-DK" sz="1400" dirty="0"/>
-          </a:p>
-          <a:p>
-            <a:pPr marL="457200" lvl="1" indent="0">
+            <a:pPr marL="0" indent="0">
               <a:buNone/>
             </a:pPr>
             <a:endParaRPr lang="da-DK" sz="1400" dirty="0"/>
           </a:p>
-          <a:p>
-            <a:pPr lvl="1"/>
-            <a:r>
-              <a:rPr lang="da-DK" sz="1400" dirty="0" err="1"/>
-              <a:t>OpenId</a:t>
-            </a:r>
-            <a:r>
-              <a:rPr lang="da-DK" sz="1400" dirty="0"/>
-              <a:t> </a:t>
-            </a:r>
-            <a:r>
-              <a:rPr lang="da-DK" sz="1400" dirty="0" err="1"/>
-              <a:t>provider</a:t>
-            </a:r>
-            <a:endParaRPr lang="da-DK" sz="1400" dirty="0"/>
-          </a:p>
-          <a:p>
-            <a:pPr lvl="2"/>
-            <a:r>
-              <a:rPr lang="da-DK" sz="1400" b="0" i="0" u="none" strike="noStrike" dirty="0">
-                <a:effectLst/>
-                <a:latin typeface="Inter"/>
-              </a:rPr>
-              <a:t>AWS </a:t>
-            </a:r>
-            <a:r>
-              <a:rPr lang="da-DK" sz="1400" b="0" i="0" u="none" strike="noStrike" dirty="0" err="1">
-                <a:effectLst/>
-                <a:latin typeface="Inter"/>
-              </a:rPr>
-              <a:t>identity</a:t>
-            </a:r>
-            <a:r>
-              <a:rPr lang="da-DK" sz="1400" b="0" i="0" u="none" strike="noStrike" dirty="0">
-                <a:effectLst/>
-                <a:latin typeface="Inter"/>
-              </a:rPr>
-              <a:t> </a:t>
-            </a:r>
-            <a:r>
-              <a:rPr lang="da-DK" sz="1400" b="0" i="0" u="none" strike="noStrike" dirty="0" err="1">
-                <a:effectLst/>
-                <a:latin typeface="Inter"/>
-              </a:rPr>
-              <a:t>provider</a:t>
-            </a:r>
-            <a:r>
-              <a:rPr lang="da-DK" sz="1400" b="0" i="0" u="none" strike="noStrike" dirty="0">
-                <a:effectLst/>
-                <a:latin typeface="Inter"/>
-              </a:rPr>
-              <a:t> for auth0.</a:t>
-            </a:r>
-            <a:endParaRPr lang="da-DK" sz="1400" dirty="0"/>
-          </a:p>
-        </p:txBody>
-      </p:sp>
+        </p:txBody>
+      </p:sp>
+      <p:pic>
+        <p:nvPicPr>
+          <p:cNvPr id="5" name="Billede 4">
+            <a:extLst>
+              <a:ext uri="{FF2B5EF4-FFF2-40B4-BE49-F238E27FC236}">
+                <a16:creationId xmlns:a16="http://schemas.microsoft.com/office/drawing/2014/main" id="{6C1CF620-864E-069C-50C9-4CB04A0293E4}"/>
+              </a:ext>
+            </a:extLst>
+          </p:cNvPr>
+          <p:cNvPicPr>
+            <a:picLocks noChangeAspect="1"/>
+          </p:cNvPicPr>
+          <p:nvPr/>
+        </p:nvPicPr>
+        <p:blipFill>
+          <a:blip r:embed="rId3"/>
+          <a:stretch>
+            <a:fillRect/>
+          </a:stretch>
+        </p:blipFill>
+        <p:spPr>
+          <a:xfrm>
+            <a:off x="838200" y="2200537"/>
+            <a:ext cx="5691554" cy="4214287"/>
+          </a:xfrm>
+          <a:prstGeom prst="rect">
+            <a:avLst/>
+          </a:prstGeom>
+        </p:spPr>
+      </p:pic>
     </p:spTree>
     <p:extLst>
       <p:ext uri="{BB962C8B-B14F-4D97-AF65-F5344CB8AC3E}">
-        <p14:creationId xmlns:p14="http://schemas.microsoft.com/office/powerpoint/2010/main" val="4004788508"/>
+        <p14:creationId xmlns:p14="http://schemas.microsoft.com/office/powerpoint/2010/main" val="73291044"/>
       </p:ext>
     </p:extLst>
   </p:cSld>
@@ -6355,10 +7637,10 @@
       </p:grpSpPr>
       <p:sp>
         <p:nvSpPr>
-          <p:cNvPr id="8" name="Rectangle 7">
-            <a:extLst>
-              <a:ext uri="{FF2B5EF4-FFF2-40B4-BE49-F238E27FC236}">
-                <a16:creationId xmlns:a16="http://schemas.microsoft.com/office/drawing/2014/main" id="{DE7FFD28-545C-4C88-A2E7-152FB234C92C}"/>
+          <p:cNvPr id="9" name="Rectangle 8">
+            <a:extLst>
+              <a:ext uri="{FF2B5EF4-FFF2-40B4-BE49-F238E27FC236}">
+                <a16:creationId xmlns:a16="http://schemas.microsoft.com/office/drawing/2014/main" id="{EBF87945-A001-489F-9D9B-7D9435F0B9CA}"/>
               </a:ext>
               <a:ext uri="{C183D7F6-B498-43B3-948B-1728B52AA6E4}">
                 <adec:decorative xmlns:adec="http://schemas.microsoft.com/office/drawing/2017/decorative" val="1"/>
@@ -6378,8 +7660,8 @@
         </p:nvSpPr>
         <p:spPr>
           <a:xfrm>
-            <a:off x="0" y="0"/>
-            <a:ext cx="12192000" cy="1911350"/>
+            <a:off x="548639" y="347471"/>
+            <a:ext cx="11100816" cy="1801368"/>
           </a:xfrm>
           <a:prstGeom prst="rect">
             <a:avLst/>
@@ -6434,7 +7716,7 @@
         </p:nvSpPr>
         <p:spPr>
           <a:xfrm>
-            <a:off x="838200" y="365125"/>
+            <a:off x="838200" y="585216"/>
             <a:ext cx="10515600" cy="1325563"/>
           </a:xfrm>
         </p:spPr>
@@ -6445,7 +7727,7 @@
           <a:lstStyle/>
           <a:p>
             <a:r>
-              <a:rPr lang="da-DK" sz="4600">
+              <a:rPr lang="da-DK">
                 <a:solidFill>
                   <a:srgbClr val="FFFFFF"/>
                 </a:solidFill>
@@ -6455,786 +7737,78 @@
           </a:p>
         </p:txBody>
       </p:sp>
-      <p:sp>
-        <p:nvSpPr>
-          <p:cNvPr id="3" name="Pladsholder til indhold 2">
-            <a:extLst>
-              <a:ext uri="{FF2B5EF4-FFF2-40B4-BE49-F238E27FC236}">
-                <a16:creationId xmlns:a16="http://schemas.microsoft.com/office/drawing/2014/main" id="{7364B8A9-43EA-665A-7052-5CAA16B615D4}"/>
-              </a:ext>
-            </a:extLst>
-          </p:cNvPr>
-          <p:cNvSpPr>
-            <a:spLocks noGrp="1"/>
-          </p:cNvSpPr>
-          <p:nvPr>
-            <p:ph idx="1"/>
-          </p:nvPr>
-        </p:nvSpPr>
+      <p:pic>
+        <p:nvPicPr>
+          <p:cNvPr id="4" name="Billede 3">
+            <a:extLst>
+              <a:ext uri="{FF2B5EF4-FFF2-40B4-BE49-F238E27FC236}">
+                <a16:creationId xmlns:a16="http://schemas.microsoft.com/office/drawing/2014/main" id="{959A9389-291D-087A-F4FC-EBAADAD36D00}"/>
+              </a:ext>
+            </a:extLst>
+          </p:cNvPr>
+          <p:cNvPicPr>
+            <a:picLocks noChangeAspect="1"/>
+          </p:cNvPicPr>
+          <p:nvPr/>
+        </p:nvPicPr>
+        <p:blipFill rotWithShape="1">
+          <a:blip r:embed="rId2"/>
+          <a:srcRect t="7205" r="3" b="3"/>
+          <a:stretch/>
+        </p:blipFill>
         <p:spPr>
           <a:xfrm>
-            <a:off x="838200" y="2438400"/>
-            <a:ext cx="10515600" cy="3738562"/>
+            <a:off x="841248" y="2516777"/>
+            <a:ext cx="6236208" cy="3660185"/>
+          </a:xfrm>
+          <a:prstGeom prst="rect">
+            <a:avLst/>
+          </a:prstGeom>
+        </p:spPr>
+      </p:pic>
+      <p:sp>
+        <p:nvSpPr>
+          <p:cNvPr id="3" name="Pladsholder til indhold 2">
+            <a:extLst>
+              <a:ext uri="{FF2B5EF4-FFF2-40B4-BE49-F238E27FC236}">
+                <a16:creationId xmlns:a16="http://schemas.microsoft.com/office/drawing/2014/main" id="{7364B8A9-43EA-665A-7052-5CAA16B615D4}"/>
+              </a:ext>
+            </a:extLst>
+          </p:cNvPr>
+          <p:cNvSpPr>
+            <a:spLocks noGrp="1"/>
+          </p:cNvSpPr>
+          <p:nvPr>
+            <p:ph idx="1"/>
+          </p:nvPr>
+        </p:nvSpPr>
+        <p:spPr>
+          <a:xfrm>
+            <a:off x="7546848" y="2516777"/>
+            <a:ext cx="3803904" cy="3660185"/>
           </a:xfrm>
         </p:spPr>
         <p:txBody>
-          <a:bodyPr>
-            <a:noAutofit/>
+          <a:bodyPr anchor="ctr">
+            <a:normAutofit/>
           </a:bodyPr>
           <a:lstStyle/>
           <a:p>
+            <a:pPr marL="457200" lvl="1" indent="0">
+              <a:buNone/>
+            </a:pPr>
+            <a:endParaRPr lang="da-DK" sz="2200"/>
+          </a:p>
+          <a:p>
             <a:pPr lvl="1"/>
-            <a:r>
-              <a:rPr lang="da-DK" sz="1400" dirty="0"/>
-              <a:t>Api </a:t>
-            </a:r>
-            <a:r>
-              <a:rPr lang="da-DK" sz="1400" dirty="0" err="1"/>
-              <a:t>that</a:t>
-            </a:r>
-            <a:r>
-              <a:rPr lang="da-DK" sz="1400" dirty="0"/>
-              <a:t> </a:t>
-            </a:r>
-            <a:r>
-              <a:rPr lang="da-DK" sz="1400" dirty="0" err="1"/>
-              <a:t>implements</a:t>
-            </a:r>
-            <a:r>
-              <a:rPr lang="da-DK" sz="1400" dirty="0"/>
-              <a:t> a </a:t>
-            </a:r>
-            <a:r>
-              <a:rPr lang="da-DK" sz="1400" dirty="0" err="1"/>
-              <a:t>Waf</a:t>
-            </a:r>
-            <a:r>
-              <a:rPr lang="da-DK" sz="1400" dirty="0"/>
-              <a:t>, </a:t>
-            </a:r>
-            <a:r>
-              <a:rPr lang="da-DK" sz="1400" dirty="0" err="1"/>
-              <a:t>network</a:t>
-            </a:r>
-            <a:r>
-              <a:rPr lang="da-DK" sz="1400" dirty="0"/>
-              <a:t> </a:t>
-            </a:r>
-            <a:r>
-              <a:rPr lang="da-DK" sz="1400" dirty="0" err="1"/>
-              <a:t>loadbalancer</a:t>
-            </a:r>
-            <a:r>
-              <a:rPr lang="da-DK" sz="1400" dirty="0"/>
-              <a:t> and </a:t>
-            </a:r>
-            <a:r>
-              <a:rPr lang="da-DK" sz="1400" dirty="0" err="1"/>
-              <a:t>ecs</a:t>
-            </a:r>
-            <a:r>
-              <a:rPr lang="da-DK" sz="1400" dirty="0"/>
-              <a:t> service.</a:t>
-            </a:r>
-          </a:p>
-          <a:p>
-            <a:pPr lvl="2"/>
-            <a:r>
-              <a:rPr lang="da-DK" sz="1400" dirty="0"/>
-              <a:t>Security </a:t>
-            </a:r>
-            <a:r>
-              <a:rPr lang="da-DK" sz="1400" dirty="0" err="1"/>
-              <a:t>groups</a:t>
-            </a:r>
-            <a:r>
-              <a:rPr lang="da-DK" sz="1400" dirty="0"/>
-              <a:t> </a:t>
-            </a:r>
-            <a:r>
-              <a:rPr lang="da-DK" sz="1400" dirty="0" err="1"/>
-              <a:t>that</a:t>
-            </a:r>
-            <a:r>
-              <a:rPr lang="da-DK" sz="1400" dirty="0"/>
-              <a:t> </a:t>
-            </a:r>
-            <a:r>
-              <a:rPr lang="da-DK" sz="1400" dirty="0" err="1"/>
-              <a:t>resticts</a:t>
-            </a:r>
-            <a:r>
-              <a:rPr lang="da-DK" sz="1400" dirty="0"/>
-              <a:t> </a:t>
-            </a:r>
-            <a:r>
-              <a:rPr lang="da-DK" sz="1400" dirty="0" err="1"/>
-              <a:t>only</a:t>
-            </a:r>
-            <a:r>
-              <a:rPr lang="da-DK" sz="1400" dirty="0"/>
-              <a:t> </a:t>
-            </a:r>
-            <a:r>
-              <a:rPr lang="da-DK" sz="1400" dirty="0" err="1"/>
-              <a:t>traffic</a:t>
-            </a:r>
-            <a:r>
-              <a:rPr lang="da-DK" sz="1400" dirty="0"/>
-              <a:t> of </a:t>
-            </a:r>
-            <a:r>
-              <a:rPr lang="da-DK" sz="1400" dirty="0" err="1"/>
-              <a:t>https</a:t>
-            </a:r>
-            <a:r>
-              <a:rPr lang="da-DK" sz="1400" dirty="0"/>
-              <a:t> </a:t>
-            </a:r>
-            <a:r>
-              <a:rPr lang="da-DK" sz="1400" dirty="0" err="1"/>
-              <a:t>between</a:t>
-            </a:r>
-            <a:r>
-              <a:rPr lang="da-DK" sz="1400" dirty="0"/>
-              <a:t> WAF, ALB, </a:t>
-            </a:r>
-            <a:r>
-              <a:rPr lang="da-DK" sz="1400" dirty="0" err="1"/>
-              <a:t>ecs</a:t>
-            </a:r>
-            <a:r>
-              <a:rPr lang="da-DK" sz="1400" dirty="0"/>
-              <a:t> service and </a:t>
-            </a:r>
-            <a:r>
-              <a:rPr lang="da-DK" sz="1400" dirty="0" err="1"/>
-              <a:t>outbound</a:t>
-            </a:r>
-            <a:r>
-              <a:rPr lang="da-DK" sz="1400" dirty="0"/>
-              <a:t> </a:t>
-            </a:r>
-            <a:r>
-              <a:rPr lang="da-DK" sz="1400" dirty="0" err="1"/>
-              <a:t>traffic</a:t>
-            </a:r>
-            <a:r>
-              <a:rPr lang="da-DK" sz="1400" dirty="0"/>
-              <a:t> to </a:t>
-            </a:r>
-            <a:r>
-              <a:rPr lang="da-DK" sz="1400" dirty="0" err="1"/>
-              <a:t>client</a:t>
-            </a:r>
-            <a:r>
-              <a:rPr lang="da-DK" sz="1400" dirty="0"/>
-              <a:t> and </a:t>
-            </a:r>
-            <a:r>
-              <a:rPr lang="da-DK" sz="1400" dirty="0" err="1"/>
-              <a:t>openid</a:t>
-            </a:r>
-            <a:r>
-              <a:rPr lang="da-DK" sz="1400" dirty="0"/>
-              <a:t> </a:t>
-            </a:r>
-            <a:r>
-              <a:rPr lang="da-DK" sz="1400" dirty="0" err="1"/>
-              <a:t>provider</a:t>
-            </a:r>
-            <a:r>
-              <a:rPr lang="da-DK" sz="1400" dirty="0"/>
-              <a:t>. If the </a:t>
-            </a:r>
-            <a:r>
-              <a:rPr lang="da-DK" sz="1400" dirty="0" err="1"/>
-              <a:t>openid</a:t>
-            </a:r>
-            <a:r>
-              <a:rPr lang="da-DK" sz="1400" dirty="0"/>
-              <a:t> </a:t>
-            </a:r>
-            <a:r>
-              <a:rPr lang="da-DK" sz="1400" dirty="0" err="1"/>
-              <a:t>provider</a:t>
-            </a:r>
-            <a:r>
-              <a:rPr lang="da-DK" sz="1400" dirty="0"/>
-              <a:t> is </a:t>
-            </a:r>
-            <a:r>
-              <a:rPr lang="da-DK" sz="1400" dirty="0" err="1"/>
-              <a:t>inside</a:t>
-            </a:r>
-            <a:r>
-              <a:rPr lang="da-DK" sz="1400" dirty="0"/>
-              <a:t> </a:t>
-            </a:r>
-          </a:p>
-          <a:p>
-            <a:pPr lvl="2"/>
-            <a:r>
-              <a:rPr lang="da-DK" sz="1400" dirty="0" err="1"/>
-              <a:t>Secutity</a:t>
-            </a:r>
-            <a:r>
-              <a:rPr lang="da-DK" sz="1400" dirty="0"/>
-              <a:t> </a:t>
-            </a:r>
-            <a:r>
-              <a:rPr lang="da-DK" sz="1400" dirty="0" err="1"/>
-              <a:t>group</a:t>
-            </a:r>
-            <a:r>
-              <a:rPr lang="da-DK" sz="1400" dirty="0"/>
-              <a:t> </a:t>
-            </a:r>
-            <a:r>
-              <a:rPr lang="da-DK" sz="1400" dirty="0" err="1"/>
-              <a:t>that</a:t>
-            </a:r>
-            <a:r>
-              <a:rPr lang="da-DK" sz="1400" dirty="0"/>
-              <a:t> </a:t>
-            </a:r>
-            <a:r>
-              <a:rPr lang="da-DK" sz="1400" dirty="0" err="1"/>
-              <a:t>allows</a:t>
-            </a:r>
-            <a:r>
-              <a:rPr lang="da-DK" sz="1400" dirty="0"/>
-              <a:t> </a:t>
-            </a:r>
-            <a:r>
-              <a:rPr lang="da-DK" sz="1400" dirty="0" err="1"/>
-              <a:t>ecs</a:t>
-            </a:r>
-            <a:r>
-              <a:rPr lang="da-DK" sz="1400" dirty="0"/>
-              <a:t> service to </a:t>
-            </a:r>
-            <a:r>
-              <a:rPr lang="da-DK" sz="1400" dirty="0" err="1"/>
-              <a:t>call</a:t>
-            </a:r>
-            <a:r>
-              <a:rPr lang="da-DK" sz="1400" dirty="0"/>
-              <a:t> RDS</a:t>
-            </a:r>
-          </a:p>
-          <a:p>
-            <a:pPr lvl="2"/>
-            <a:r>
-              <a:rPr lang="da-DK" sz="1400" dirty="0"/>
-              <a:t>IAM </a:t>
-            </a:r>
-            <a:r>
-              <a:rPr lang="da-DK" sz="1400" dirty="0" err="1"/>
-              <a:t>roles</a:t>
-            </a:r>
-            <a:r>
-              <a:rPr lang="da-DK" sz="1400" dirty="0"/>
-              <a:t> </a:t>
-            </a:r>
-            <a:r>
-              <a:rPr lang="da-DK" sz="1400" dirty="0" err="1"/>
-              <a:t>that</a:t>
-            </a:r>
-            <a:r>
-              <a:rPr lang="da-DK" sz="1400" dirty="0"/>
-              <a:t> </a:t>
-            </a:r>
-            <a:r>
-              <a:rPr lang="da-DK" sz="1400" dirty="0" err="1"/>
-              <a:t>lock</a:t>
-            </a:r>
-            <a:r>
-              <a:rPr lang="da-DK" sz="1400" dirty="0"/>
-              <a:t> </a:t>
-            </a:r>
-            <a:r>
-              <a:rPr lang="da-DK" sz="1400" dirty="0" err="1"/>
-              <a:t>down</a:t>
-            </a:r>
-            <a:r>
-              <a:rPr lang="da-DK" sz="1400" dirty="0"/>
-              <a:t> </a:t>
-            </a:r>
-            <a:r>
-              <a:rPr lang="da-DK" sz="1400" dirty="0" err="1"/>
-              <a:t>access</a:t>
-            </a:r>
-            <a:r>
-              <a:rPr lang="da-DK" sz="1400" dirty="0"/>
-              <a:t> to </a:t>
-            </a:r>
-            <a:r>
-              <a:rPr lang="da-DK" sz="1400" dirty="0" err="1"/>
-              <a:t>only</a:t>
-            </a:r>
-            <a:r>
-              <a:rPr lang="da-DK" sz="1400" dirty="0"/>
-              <a:t> the </a:t>
-            </a:r>
-            <a:r>
-              <a:rPr lang="da-DK" sz="1400" dirty="0" err="1"/>
-              <a:t>resources</a:t>
-            </a:r>
-            <a:r>
-              <a:rPr lang="da-DK" sz="1400" dirty="0"/>
-              <a:t> </a:t>
-            </a:r>
-            <a:r>
-              <a:rPr lang="da-DK" sz="1400" dirty="0" err="1"/>
-              <a:t>that</a:t>
-            </a:r>
-            <a:r>
-              <a:rPr lang="da-DK" sz="1400" dirty="0"/>
-              <a:t> </a:t>
-            </a:r>
-            <a:r>
-              <a:rPr lang="da-DK" sz="1400" dirty="0" err="1"/>
-              <a:t>should</a:t>
-            </a:r>
-            <a:r>
-              <a:rPr lang="da-DK" sz="1400" dirty="0"/>
-              <a:t> </a:t>
-            </a:r>
-            <a:r>
-              <a:rPr lang="da-DK" sz="1400" dirty="0" err="1"/>
-              <a:t>be</a:t>
-            </a:r>
-            <a:r>
-              <a:rPr lang="da-DK" sz="1400" dirty="0"/>
-              <a:t> </a:t>
-            </a:r>
-            <a:r>
-              <a:rPr lang="da-DK" sz="1400" dirty="0" err="1"/>
-              <a:t>accessed</a:t>
-            </a:r>
-            <a:r>
-              <a:rPr lang="da-DK" sz="1400" dirty="0"/>
-              <a:t>.</a:t>
-            </a:r>
-          </a:p>
-          <a:p>
-            <a:pPr lvl="2"/>
-            <a:r>
-              <a:rPr lang="da-DK" sz="1400" dirty="0"/>
-              <a:t>Model on </a:t>
-            </a:r>
-            <a:r>
-              <a:rPr lang="da-DK" sz="1400" dirty="0" err="1"/>
-              <a:t>api</a:t>
-            </a:r>
-            <a:r>
-              <a:rPr lang="da-DK" sz="1400" dirty="0"/>
-              <a:t> gateway </a:t>
-            </a:r>
-            <a:r>
-              <a:rPr lang="da-DK" sz="1400" dirty="0" err="1"/>
-              <a:t>that</a:t>
-            </a:r>
-            <a:r>
-              <a:rPr lang="da-DK" sz="1400" dirty="0"/>
-              <a:t> </a:t>
-            </a:r>
-            <a:r>
-              <a:rPr lang="da-DK" sz="1400" dirty="0" err="1"/>
-              <a:t>does</a:t>
-            </a:r>
-            <a:r>
-              <a:rPr lang="da-DK" sz="1400" dirty="0"/>
-              <a:t> </a:t>
-            </a:r>
-            <a:r>
-              <a:rPr lang="da-DK" sz="1400" dirty="0" err="1"/>
-              <a:t>upfront</a:t>
-            </a:r>
-            <a:r>
-              <a:rPr lang="da-DK" sz="1400" dirty="0"/>
-              <a:t> </a:t>
-            </a:r>
-            <a:r>
-              <a:rPr lang="da-DK" sz="1400" dirty="0" err="1"/>
-              <a:t>validation</a:t>
-            </a:r>
-            <a:r>
-              <a:rPr lang="da-DK" sz="1400" dirty="0"/>
-              <a:t> of </a:t>
-            </a:r>
-            <a:r>
-              <a:rPr lang="da-DK" sz="1400" dirty="0" err="1"/>
-              <a:t>request</a:t>
-            </a:r>
-            <a:r>
-              <a:rPr lang="da-DK" sz="1400" dirty="0"/>
-              <a:t> and </a:t>
-            </a:r>
-            <a:r>
-              <a:rPr lang="da-DK" sz="1400" dirty="0" err="1"/>
-              <a:t>openId</a:t>
-            </a:r>
-            <a:r>
-              <a:rPr lang="da-DK" sz="1400" dirty="0"/>
-              <a:t>, so </a:t>
-            </a:r>
-            <a:r>
-              <a:rPr lang="da-DK" sz="1400" dirty="0" err="1"/>
-              <a:t>backend</a:t>
-            </a:r>
-            <a:r>
-              <a:rPr lang="da-DK" sz="1400" dirty="0"/>
-              <a:t> services </a:t>
-            </a:r>
-            <a:r>
-              <a:rPr lang="da-DK" sz="1400" dirty="0" err="1"/>
-              <a:t>are</a:t>
-            </a:r>
-            <a:r>
-              <a:rPr lang="da-DK" sz="1400" dirty="0"/>
-              <a:t> not </a:t>
-            </a:r>
-            <a:r>
-              <a:rPr lang="da-DK" sz="1400" dirty="0" err="1"/>
-              <a:t>being</a:t>
-            </a:r>
-            <a:r>
-              <a:rPr lang="da-DK" sz="1400" dirty="0"/>
-              <a:t> </a:t>
-            </a:r>
-            <a:r>
-              <a:rPr lang="da-DK" sz="1400" dirty="0" err="1"/>
-              <a:t>called</a:t>
-            </a:r>
-            <a:r>
-              <a:rPr lang="da-DK" sz="1400" dirty="0"/>
-              <a:t> </a:t>
-            </a:r>
-            <a:r>
-              <a:rPr lang="da-DK" sz="1400" dirty="0" err="1"/>
-              <a:t>if</a:t>
-            </a:r>
-            <a:r>
-              <a:rPr lang="da-DK" sz="1400" dirty="0"/>
-              <a:t> user is not </a:t>
-            </a:r>
-            <a:r>
-              <a:rPr lang="da-DK" sz="1400" dirty="0" err="1"/>
-              <a:t>validated</a:t>
-            </a:r>
-            <a:r>
-              <a:rPr lang="da-DK" sz="1400" dirty="0"/>
-              <a:t>. </a:t>
-            </a:r>
-          </a:p>
-          <a:p>
-            <a:pPr lvl="2"/>
-            <a:r>
-              <a:rPr lang="da-DK" sz="1400" dirty="0"/>
-              <a:t>”Usage” of </a:t>
-            </a:r>
-            <a:r>
-              <a:rPr lang="da-DK" sz="1400" dirty="0" err="1"/>
-              <a:t>Aws</a:t>
-            </a:r>
-            <a:r>
-              <a:rPr lang="da-DK" sz="1400" dirty="0"/>
-              <a:t> </a:t>
-            </a:r>
-            <a:r>
-              <a:rPr lang="da-DK" sz="1400" dirty="0" err="1"/>
-              <a:t>identity</a:t>
-            </a:r>
-            <a:r>
-              <a:rPr lang="da-DK" sz="1400" dirty="0"/>
-              <a:t> </a:t>
-            </a:r>
-            <a:r>
-              <a:rPr lang="da-DK" sz="1400" dirty="0" err="1"/>
-              <a:t>provider</a:t>
-            </a:r>
-            <a:r>
-              <a:rPr lang="da-DK" sz="1400" dirty="0"/>
-              <a:t>.</a:t>
-            </a:r>
-          </a:p>
-          <a:p>
-            <a:pPr lvl="2"/>
-            <a:r>
-              <a:rPr lang="da-DK" sz="1400" dirty="0" err="1"/>
-              <a:t>Autoscaling</a:t>
-            </a:r>
-            <a:r>
-              <a:rPr lang="da-DK" sz="1400" dirty="0"/>
-              <a:t> on cpu / </a:t>
-            </a:r>
-            <a:r>
-              <a:rPr lang="da-DK" sz="1400" dirty="0" err="1"/>
-              <a:t>mem</a:t>
-            </a:r>
-            <a:endParaRPr lang="da-DK" sz="1400" dirty="0"/>
-          </a:p>
-          <a:p>
-            <a:pPr lvl="2"/>
-            <a:endParaRPr lang="da-DK" sz="1400" dirty="0"/>
-          </a:p>
-          <a:p>
-            <a:pPr lvl="1"/>
-            <a:r>
-              <a:rPr lang="da-DK" sz="1400" dirty="0"/>
-              <a:t>RDS in a </a:t>
-            </a:r>
-            <a:r>
-              <a:rPr lang="da-DK" sz="1400" dirty="0" err="1"/>
-              <a:t>multi</a:t>
-            </a:r>
-            <a:r>
-              <a:rPr lang="da-DK" sz="1400" dirty="0"/>
-              <a:t> AZ </a:t>
-            </a:r>
-            <a:r>
-              <a:rPr lang="da-DK" sz="1400" dirty="0" err="1"/>
-              <a:t>setup</a:t>
-            </a:r>
-            <a:r>
-              <a:rPr lang="da-DK" sz="1400" dirty="0"/>
-              <a:t>.</a:t>
-            </a:r>
-          </a:p>
-          <a:p>
-            <a:pPr lvl="2"/>
-            <a:r>
-              <a:rPr lang="da-DK" sz="1400" dirty="0"/>
-              <a:t>The RDS has </a:t>
-            </a:r>
-            <a:r>
-              <a:rPr lang="da-DK" sz="1400" dirty="0" err="1"/>
-              <a:t>encryption</a:t>
-            </a:r>
-            <a:r>
-              <a:rPr lang="da-DK" sz="1400" dirty="0"/>
-              <a:t> with a KMS </a:t>
-            </a:r>
-            <a:r>
-              <a:rPr lang="da-DK" sz="1400" dirty="0" err="1"/>
-              <a:t>key</a:t>
-            </a:r>
-            <a:r>
-              <a:rPr lang="da-DK" sz="1400" dirty="0"/>
-              <a:t>. The </a:t>
-            </a:r>
-            <a:r>
-              <a:rPr lang="da-DK" sz="1400" dirty="0" err="1"/>
-              <a:t>kms</a:t>
-            </a:r>
-            <a:r>
-              <a:rPr lang="da-DK" sz="1400" dirty="0"/>
-              <a:t> </a:t>
-            </a:r>
-            <a:r>
-              <a:rPr lang="da-DK" sz="1400" dirty="0" err="1"/>
-              <a:t>key</a:t>
-            </a:r>
-            <a:r>
-              <a:rPr lang="da-DK" sz="1400" dirty="0"/>
-              <a:t> </a:t>
-            </a:r>
-            <a:r>
-              <a:rPr lang="da-DK" sz="1400" dirty="0" err="1"/>
-              <a:t>can</a:t>
-            </a:r>
-            <a:r>
-              <a:rPr lang="da-DK" sz="1400" dirty="0"/>
-              <a:t> </a:t>
-            </a:r>
-            <a:r>
-              <a:rPr lang="da-DK" sz="1400" dirty="0" err="1"/>
-              <a:t>be</a:t>
-            </a:r>
-            <a:r>
-              <a:rPr lang="da-DK" sz="1400" dirty="0"/>
-              <a:t> </a:t>
-            </a:r>
-            <a:r>
-              <a:rPr lang="da-DK" sz="1400" dirty="0" err="1"/>
-              <a:t>managed</a:t>
-            </a:r>
-            <a:r>
-              <a:rPr lang="da-DK" sz="1400" dirty="0"/>
-              <a:t> or </a:t>
-            </a:r>
-            <a:r>
-              <a:rPr lang="da-DK" sz="1400" dirty="0" err="1"/>
-              <a:t>unmanaged</a:t>
-            </a:r>
-            <a:r>
-              <a:rPr lang="da-DK" sz="1400" dirty="0"/>
-              <a:t> </a:t>
-            </a:r>
-            <a:r>
-              <a:rPr lang="da-DK" sz="1400" dirty="0" err="1"/>
-              <a:t>depending</a:t>
-            </a:r>
-            <a:r>
-              <a:rPr lang="da-DK" sz="1400" dirty="0"/>
-              <a:t> on </a:t>
-            </a:r>
-            <a:r>
-              <a:rPr lang="da-DK" sz="1400" dirty="0" err="1"/>
-              <a:t>what</a:t>
-            </a:r>
-            <a:r>
-              <a:rPr lang="da-DK" sz="1400" dirty="0"/>
-              <a:t> the </a:t>
-            </a:r>
-          </a:p>
-          <a:p>
-            <a:pPr lvl="2"/>
-            <a:r>
-              <a:rPr lang="da-DK" sz="1400" dirty="0" err="1"/>
-              <a:t>Consider</a:t>
-            </a:r>
-            <a:r>
-              <a:rPr lang="da-DK" sz="1400" dirty="0"/>
-              <a:t> </a:t>
-            </a:r>
-            <a:r>
-              <a:rPr lang="da-DK" sz="1400" dirty="0" err="1"/>
-              <a:t>usage</a:t>
-            </a:r>
-            <a:r>
-              <a:rPr lang="da-DK" sz="1400" dirty="0"/>
-              <a:t> of </a:t>
-            </a:r>
-            <a:r>
-              <a:rPr lang="da-DK" sz="1400" dirty="0" err="1"/>
-              <a:t>serverless</a:t>
-            </a:r>
-            <a:r>
-              <a:rPr lang="da-DK" sz="1400" dirty="0"/>
-              <a:t> </a:t>
-            </a:r>
-            <a:r>
-              <a:rPr lang="da-DK" sz="1400" dirty="0" err="1"/>
-              <a:t>instance</a:t>
-            </a:r>
-            <a:r>
-              <a:rPr lang="da-DK" sz="1400" dirty="0"/>
-              <a:t> type to </a:t>
-            </a:r>
-            <a:r>
-              <a:rPr lang="da-DK" sz="1400" dirty="0" err="1"/>
-              <a:t>get</a:t>
-            </a:r>
-            <a:r>
-              <a:rPr lang="da-DK" sz="1400" dirty="0"/>
-              <a:t> faster </a:t>
-            </a:r>
-            <a:r>
-              <a:rPr lang="da-DK" sz="1400" dirty="0" err="1"/>
-              <a:t>scaling</a:t>
-            </a:r>
-            <a:r>
-              <a:rPr lang="da-DK" sz="1400" dirty="0"/>
-              <a:t> of </a:t>
-            </a:r>
-            <a:r>
-              <a:rPr lang="da-DK" sz="1400" dirty="0" err="1"/>
-              <a:t>capacity</a:t>
-            </a:r>
-            <a:r>
-              <a:rPr lang="da-DK" sz="1400" dirty="0"/>
-              <a:t> (ACU). </a:t>
-            </a:r>
-            <a:r>
-              <a:rPr lang="da-DK" sz="1400" dirty="0" err="1"/>
-              <a:t>Serverless</a:t>
-            </a:r>
-            <a:r>
-              <a:rPr lang="da-DK" sz="1400" dirty="0"/>
-              <a:t> </a:t>
-            </a:r>
-            <a:r>
-              <a:rPr lang="da-DK" sz="1400" dirty="0" err="1"/>
-              <a:t>should</a:t>
-            </a:r>
-            <a:r>
-              <a:rPr lang="da-DK" sz="1400" dirty="0"/>
-              <a:t> </a:t>
-            </a:r>
-            <a:r>
-              <a:rPr lang="da-DK" sz="1400" dirty="0" err="1"/>
-              <a:t>only</a:t>
-            </a:r>
-            <a:r>
-              <a:rPr lang="da-DK" sz="1400" dirty="0"/>
-              <a:t> </a:t>
-            </a:r>
-            <a:r>
-              <a:rPr lang="da-DK" sz="1400" dirty="0" err="1"/>
-              <a:t>be</a:t>
-            </a:r>
-            <a:r>
-              <a:rPr lang="da-DK" sz="1400" dirty="0"/>
-              <a:t> </a:t>
-            </a:r>
-            <a:r>
-              <a:rPr lang="da-DK" sz="1400" dirty="0" err="1"/>
-              <a:t>used</a:t>
-            </a:r>
-            <a:r>
-              <a:rPr lang="da-DK" sz="1400" dirty="0"/>
-              <a:t> server has time to </a:t>
-            </a:r>
-            <a:r>
-              <a:rPr lang="da-DK" sz="1400" dirty="0" err="1"/>
-              <a:t>scale</a:t>
-            </a:r>
-            <a:r>
-              <a:rPr lang="da-DK" sz="1400" dirty="0"/>
-              <a:t> </a:t>
-            </a:r>
-            <a:r>
-              <a:rPr lang="da-DK" sz="1400" dirty="0" err="1"/>
-              <a:t>down</a:t>
-            </a:r>
-            <a:r>
-              <a:rPr lang="da-DK" sz="1400" dirty="0"/>
-              <a:t> </a:t>
-            </a:r>
-            <a:r>
-              <a:rPr lang="da-DK" sz="1400" dirty="0" err="1"/>
-              <a:t>again</a:t>
-            </a:r>
-            <a:r>
-              <a:rPr lang="da-DK" sz="1400" dirty="0"/>
-              <a:t> and not </a:t>
-            </a:r>
-            <a:r>
-              <a:rPr lang="da-DK" sz="1400" dirty="0" err="1"/>
-              <a:t>always</a:t>
-            </a:r>
-            <a:r>
-              <a:rPr lang="da-DK" sz="1400" dirty="0"/>
-              <a:t> is on max.</a:t>
-            </a:r>
-          </a:p>
-          <a:p>
-            <a:pPr lvl="2"/>
-            <a:endParaRPr lang="da-DK" sz="1400" dirty="0"/>
-          </a:p>
-          <a:p>
-            <a:pPr lvl="1"/>
-            <a:endParaRPr lang="da-DK" sz="1400" dirty="0"/>
+            <a:endParaRPr lang="da-DK" sz="2200"/>
           </a:p>
         </p:txBody>
       </p:sp>
     </p:spTree>
     <p:extLst>
       <p:ext uri="{BB962C8B-B14F-4D97-AF65-F5344CB8AC3E}">
-        <p14:creationId xmlns:p14="http://schemas.microsoft.com/office/powerpoint/2010/main" val="236876047"/>
+        <p14:creationId xmlns:p14="http://schemas.microsoft.com/office/powerpoint/2010/main" val="48160818"/>
       </p:ext>
     </p:extLst>
   </p:cSld>
@@ -7361,20 +7935,12 @@
           <a:lstStyle/>
           <a:p>
             <a:r>
-              <a:rPr lang="da-DK" sz="4600" dirty="0">
-                <a:solidFill>
-                  <a:srgbClr val="FFFFFF"/>
-                </a:solidFill>
-              </a:rPr>
-              <a:t>Rest </a:t>
-            </a:r>
-            <a:r>
               <a:rPr lang="da-DK" sz="4600" dirty="0" err="1">
                 <a:solidFill>
                   <a:srgbClr val="FFFFFF"/>
                 </a:solidFill>
               </a:rPr>
-              <a:t>api</a:t>
+              <a:t>Infrastucture</a:t>
             </a:r>
             <a:r>
               <a:rPr lang="da-DK" sz="4600" dirty="0">
@@ -7411,245 +7977,37 @@
         </p:spPr>
         <p:txBody>
           <a:bodyPr>
-            <a:normAutofit/>
+            <a:noAutofit/>
           </a:bodyPr>
           <a:lstStyle/>
           <a:p>
             <a:r>
               <a:rPr lang="da-DK" sz="1400" dirty="0"/>
-              <a:t>The rest </a:t>
-            </a:r>
-            <a:r>
-              <a:rPr lang="da-DK" sz="1400" dirty="0" err="1"/>
-              <a:t>api</a:t>
-            </a:r>
-            <a:r>
-              <a:rPr lang="da-DK" sz="1400" dirty="0"/>
-              <a:t> is </a:t>
-            </a:r>
-            <a:r>
-              <a:rPr lang="da-DK" sz="1400" dirty="0" err="1"/>
-              <a:t>implementated</a:t>
-            </a:r>
-            <a:r>
-              <a:rPr lang="da-DK" sz="1400" dirty="0"/>
-              <a:t> as a </a:t>
-            </a:r>
-            <a:r>
-              <a:rPr lang="da-DK" sz="1400" dirty="0" err="1"/>
-              <a:t>docker</a:t>
-            </a:r>
-            <a:r>
-              <a:rPr lang="da-DK" sz="1400" dirty="0"/>
-              <a:t> on .net core with the </a:t>
-            </a:r>
-            <a:r>
-              <a:rPr lang="da-DK" sz="1400" dirty="0" err="1"/>
-              <a:t>following</a:t>
-            </a:r>
-            <a:r>
-              <a:rPr lang="da-DK" sz="1400" dirty="0"/>
-              <a:t> </a:t>
-            </a:r>
-            <a:r>
-              <a:rPr lang="da-DK" sz="1400" dirty="0" err="1"/>
-              <a:t>openId</a:t>
-            </a:r>
-            <a:r>
-              <a:rPr lang="da-DK" sz="1400" dirty="0"/>
-              <a:t> </a:t>
-            </a:r>
-            <a:r>
-              <a:rPr lang="da-DK" sz="1400" dirty="0" err="1"/>
-              <a:t>scopes</a:t>
-            </a:r>
-            <a:r>
-              <a:rPr lang="da-DK" sz="1400" dirty="0"/>
-              <a:t> </a:t>
-            </a:r>
-            <a:r>
-              <a:rPr lang="da-DK" sz="1400" dirty="0" err="1"/>
-              <a:t>talker</a:t>
-            </a:r>
-            <a:r>
-              <a:rPr lang="da-DK" sz="1400" dirty="0"/>
-              <a:t>, participant and administrator. The </a:t>
-            </a:r>
-            <a:r>
-              <a:rPr lang="da-DK" sz="1400" dirty="0" err="1"/>
-              <a:t>brewer</a:t>
-            </a:r>
-            <a:r>
-              <a:rPr lang="da-DK" sz="1400" dirty="0"/>
-              <a:t> and </a:t>
-            </a:r>
-            <a:r>
-              <a:rPr lang="da-DK" sz="1400" dirty="0" err="1"/>
-              <a:t>topic</a:t>
-            </a:r>
-            <a:r>
-              <a:rPr lang="da-DK" sz="1400" dirty="0"/>
-              <a:t> </a:t>
-            </a:r>
-            <a:r>
-              <a:rPr lang="da-DK" sz="1400" dirty="0" err="1"/>
-              <a:t>api</a:t>
-            </a:r>
-            <a:r>
-              <a:rPr lang="da-DK" sz="1400" dirty="0"/>
-              <a:t> </a:t>
-            </a:r>
-            <a:r>
-              <a:rPr lang="da-DK" sz="1400" dirty="0" err="1"/>
-              <a:t>call</a:t>
-            </a:r>
-            <a:r>
-              <a:rPr lang="da-DK" sz="1400" dirty="0"/>
-              <a:t> </a:t>
-            </a:r>
-            <a:r>
-              <a:rPr lang="da-DK" sz="1400" dirty="0" err="1"/>
-              <a:t>could</a:t>
-            </a:r>
-            <a:r>
-              <a:rPr lang="da-DK" sz="1400" dirty="0"/>
-              <a:t> </a:t>
-            </a:r>
-            <a:r>
-              <a:rPr lang="da-DK" sz="1400" dirty="0" err="1"/>
-              <a:t>also</a:t>
-            </a:r>
-            <a:r>
-              <a:rPr lang="da-DK" sz="1400" dirty="0"/>
-              <a:t> </a:t>
-            </a:r>
-            <a:r>
-              <a:rPr lang="da-DK" sz="1400" dirty="0" err="1"/>
-              <a:t>be</a:t>
-            </a:r>
-            <a:r>
-              <a:rPr lang="da-DK" sz="1400" dirty="0"/>
-              <a:t> </a:t>
-            </a:r>
-            <a:r>
-              <a:rPr lang="da-DK" sz="1400" dirty="0" err="1"/>
-              <a:t>orchestrated</a:t>
-            </a:r>
-            <a:r>
-              <a:rPr lang="da-DK" sz="1400" dirty="0"/>
-              <a:t> in a </a:t>
-            </a:r>
-            <a:r>
-              <a:rPr lang="da-DK" sz="1400" dirty="0" err="1"/>
-              <a:t>node.js</a:t>
-            </a:r>
-            <a:r>
-              <a:rPr lang="da-DK" sz="1400" dirty="0"/>
-              <a:t> rest </a:t>
-            </a:r>
-            <a:r>
-              <a:rPr lang="da-DK" sz="1400" dirty="0" err="1"/>
-              <a:t>api</a:t>
-            </a:r>
-            <a:r>
-              <a:rPr lang="da-DK" sz="1400" dirty="0"/>
-              <a:t> </a:t>
-            </a:r>
-            <a:r>
-              <a:rPr lang="da-DK" sz="1400" dirty="0" err="1"/>
-              <a:t>since</a:t>
-            </a:r>
-            <a:r>
-              <a:rPr lang="da-DK" sz="1400" dirty="0"/>
-              <a:t> the </a:t>
-            </a:r>
-            <a:r>
-              <a:rPr lang="da-DK" sz="1400" dirty="0" err="1"/>
-              <a:t>are</a:t>
-            </a:r>
-            <a:r>
-              <a:rPr lang="da-DK" sz="1400" dirty="0"/>
-              <a:t> open but </a:t>
-            </a:r>
-            <a:r>
-              <a:rPr lang="da-DK" sz="1400" dirty="0" err="1"/>
-              <a:t>doing</a:t>
-            </a:r>
-            <a:r>
-              <a:rPr lang="da-DK" sz="1400" dirty="0"/>
-              <a:t> </a:t>
-            </a:r>
-            <a:r>
-              <a:rPr lang="da-DK" sz="1400" dirty="0" err="1"/>
-              <a:t>this</a:t>
-            </a:r>
-            <a:r>
-              <a:rPr lang="da-DK" sz="1400" dirty="0"/>
-              <a:t> </a:t>
-            </a:r>
-            <a:r>
-              <a:rPr lang="da-DK" sz="1400" dirty="0" err="1"/>
-              <a:t>will</a:t>
-            </a:r>
-            <a:r>
-              <a:rPr lang="da-DK" sz="1400" dirty="0"/>
-              <a:t> give a extra </a:t>
-            </a:r>
-            <a:r>
-              <a:rPr lang="da-DK" sz="1400" dirty="0" err="1"/>
-              <a:t>latency</a:t>
-            </a:r>
-            <a:r>
-              <a:rPr lang="da-DK" sz="1400" dirty="0"/>
-              <a:t> </a:t>
-            </a:r>
-            <a:r>
-              <a:rPr lang="da-DK" sz="1400" dirty="0" err="1"/>
-              <a:t>when</a:t>
-            </a:r>
-            <a:r>
-              <a:rPr lang="da-DK" sz="1400" dirty="0"/>
-              <a:t> </a:t>
-            </a:r>
-            <a:r>
-              <a:rPr lang="da-DK" sz="1400" dirty="0" err="1"/>
-              <a:t>calling</a:t>
-            </a:r>
-            <a:r>
-              <a:rPr lang="da-DK" sz="1400" dirty="0"/>
-              <a:t> and extra service. So the tought is </a:t>
-            </a:r>
-            <a:r>
-              <a:rPr lang="da-DK" sz="1400" dirty="0" err="1"/>
-              <a:t>that</a:t>
-            </a:r>
-            <a:r>
-              <a:rPr lang="da-DK" sz="1400" dirty="0"/>
-              <a:t> the administrator </a:t>
-            </a:r>
-            <a:r>
-              <a:rPr lang="da-DK" sz="1400" dirty="0" err="1"/>
-              <a:t>can</a:t>
-            </a:r>
-            <a:r>
-              <a:rPr lang="da-DK" sz="1400" dirty="0"/>
-              <a:t> import venues and </a:t>
-            </a:r>
-            <a:r>
-              <a:rPr lang="da-DK" sz="1400" dirty="0" err="1"/>
-              <a:t>topics</a:t>
-            </a:r>
-            <a:r>
-              <a:rPr lang="da-DK" sz="1400" dirty="0"/>
-              <a:t> from the </a:t>
-            </a:r>
-            <a:r>
-              <a:rPr lang="da-DK" sz="1400" dirty="0" err="1"/>
-              <a:t>api</a:t>
-            </a:r>
-            <a:r>
-              <a:rPr lang="da-DK" sz="1400" dirty="0"/>
-              <a:t> to the database. </a:t>
+              <a:t>The solution is base </a:t>
+            </a:r>
+            <a:r>
+              <a:rPr lang="da-DK" sz="1400" dirty="0" err="1"/>
+              <a:t>consists</a:t>
+            </a:r>
+            <a:r>
+              <a:rPr lang="da-DK" sz="1400" dirty="0"/>
+              <a:t> of </a:t>
+            </a:r>
+            <a:r>
+              <a:rPr lang="da-DK" sz="1400" dirty="0" err="1"/>
+              <a:t>four</a:t>
+            </a:r>
+            <a:r>
+              <a:rPr lang="da-DK" sz="1400" dirty="0"/>
+              <a:t> </a:t>
+            </a:r>
+            <a:r>
+              <a:rPr lang="da-DK" sz="1400" dirty="0" err="1"/>
+              <a:t>main</a:t>
+            </a:r>
+            <a:r>
+              <a:rPr lang="da-DK" sz="1400" dirty="0"/>
+              <a:t> components</a:t>
             </a:r>
           </a:p>
           <a:p>
@@ -7659,22 +8017,428 @@
             <a:endParaRPr lang="da-DK" sz="1400" dirty="0"/>
           </a:p>
           <a:p>
+            <a:pPr lvl="1"/>
+            <a:r>
+              <a:rPr lang="da-DK" sz="1400" dirty="0" err="1"/>
+              <a:t>Frontend</a:t>
+            </a:r>
+            <a:r>
+              <a:rPr lang="da-DK" sz="1400" dirty="0"/>
+              <a:t> </a:t>
+            </a:r>
+            <a:r>
+              <a:rPr lang="da-DK" sz="1400" dirty="0" err="1"/>
+              <a:t>that</a:t>
+            </a:r>
+            <a:r>
+              <a:rPr lang="da-DK" sz="1400" dirty="0"/>
+              <a:t> </a:t>
+            </a:r>
+            <a:r>
+              <a:rPr lang="da-DK" sz="1400" dirty="0" err="1"/>
+              <a:t>implements</a:t>
+            </a:r>
+            <a:r>
+              <a:rPr lang="da-DK" sz="1400" dirty="0"/>
+              <a:t> a </a:t>
+            </a:r>
+            <a:r>
+              <a:rPr lang="da-DK" sz="1400" dirty="0" err="1"/>
+              <a:t>Waf</a:t>
+            </a:r>
+            <a:r>
+              <a:rPr lang="da-DK" sz="1400" dirty="0"/>
+              <a:t>, </a:t>
+            </a:r>
+            <a:r>
+              <a:rPr lang="da-DK" sz="1400" dirty="0" err="1"/>
+              <a:t>application</a:t>
+            </a:r>
+            <a:r>
+              <a:rPr lang="da-DK" sz="1400" dirty="0"/>
+              <a:t> </a:t>
+            </a:r>
+            <a:r>
+              <a:rPr lang="da-DK" sz="1400" dirty="0" err="1"/>
+              <a:t>loadbalancer</a:t>
+            </a:r>
+            <a:r>
+              <a:rPr lang="da-DK" sz="1400" dirty="0"/>
+              <a:t> and </a:t>
+            </a:r>
+            <a:r>
+              <a:rPr lang="da-DK" sz="1400" dirty="0" err="1"/>
+              <a:t>ecs</a:t>
+            </a:r>
+            <a:r>
+              <a:rPr lang="da-DK" sz="1400" dirty="0"/>
+              <a:t> service.</a:t>
+            </a:r>
+          </a:p>
+          <a:p>
+            <a:pPr lvl="2"/>
+            <a:r>
+              <a:rPr lang="da-DK" sz="1400" dirty="0"/>
+              <a:t>Security </a:t>
+            </a:r>
+            <a:r>
+              <a:rPr lang="da-DK" sz="1400" dirty="0" err="1"/>
+              <a:t>groups</a:t>
+            </a:r>
+            <a:r>
+              <a:rPr lang="da-DK" sz="1400" dirty="0"/>
+              <a:t> </a:t>
+            </a:r>
+            <a:r>
+              <a:rPr lang="da-DK" sz="1400" dirty="0" err="1"/>
+              <a:t>that</a:t>
+            </a:r>
+            <a:r>
+              <a:rPr lang="da-DK" sz="1400" dirty="0"/>
+              <a:t> </a:t>
+            </a:r>
+            <a:r>
+              <a:rPr lang="da-DK" sz="1400" dirty="0" err="1"/>
+              <a:t>resticts</a:t>
+            </a:r>
+            <a:r>
+              <a:rPr lang="da-DK" sz="1400" dirty="0"/>
+              <a:t> </a:t>
+            </a:r>
+            <a:r>
+              <a:rPr lang="da-DK" sz="1400" dirty="0" err="1"/>
+              <a:t>only</a:t>
+            </a:r>
+            <a:r>
+              <a:rPr lang="da-DK" sz="1400" dirty="0"/>
+              <a:t> </a:t>
+            </a:r>
+            <a:r>
+              <a:rPr lang="da-DK" sz="1400" dirty="0" err="1"/>
+              <a:t>traffic</a:t>
+            </a:r>
+            <a:r>
+              <a:rPr lang="da-DK" sz="1400" dirty="0"/>
+              <a:t> of </a:t>
+            </a:r>
+            <a:r>
+              <a:rPr lang="da-DK" sz="1400" dirty="0" err="1"/>
+              <a:t>https</a:t>
+            </a:r>
+            <a:r>
+              <a:rPr lang="da-DK" sz="1400" dirty="0"/>
+              <a:t> </a:t>
+            </a:r>
+            <a:r>
+              <a:rPr lang="da-DK" sz="1400" dirty="0" err="1"/>
+              <a:t>between</a:t>
+            </a:r>
+            <a:r>
+              <a:rPr lang="da-DK" sz="1400" dirty="0"/>
+              <a:t> WAF, ALB, </a:t>
+            </a:r>
+            <a:r>
+              <a:rPr lang="da-DK" sz="1400" dirty="0" err="1"/>
+              <a:t>ecs</a:t>
+            </a:r>
+            <a:r>
+              <a:rPr lang="da-DK" sz="1400" dirty="0"/>
+              <a:t> service and </a:t>
+            </a:r>
+            <a:r>
+              <a:rPr lang="da-DK" sz="1400" dirty="0" err="1"/>
+              <a:t>outbound</a:t>
+            </a:r>
+            <a:r>
+              <a:rPr lang="da-DK" sz="1400" dirty="0"/>
+              <a:t> </a:t>
+            </a:r>
+            <a:r>
+              <a:rPr lang="da-DK" sz="1400" dirty="0" err="1"/>
+              <a:t>traffic</a:t>
+            </a:r>
+            <a:r>
+              <a:rPr lang="da-DK" sz="1400" dirty="0"/>
+              <a:t> to </a:t>
+            </a:r>
+            <a:r>
+              <a:rPr lang="da-DK" sz="1400" dirty="0" err="1"/>
+              <a:t>client</a:t>
+            </a:r>
+            <a:r>
+              <a:rPr lang="da-DK" sz="1400" dirty="0"/>
+              <a:t> and </a:t>
+            </a:r>
+            <a:r>
+              <a:rPr lang="da-DK" sz="1400" dirty="0" err="1"/>
+              <a:t>openid</a:t>
+            </a:r>
+            <a:r>
+              <a:rPr lang="da-DK" sz="1400" dirty="0"/>
+              <a:t> </a:t>
+            </a:r>
+            <a:r>
+              <a:rPr lang="da-DK" sz="1400" dirty="0" err="1"/>
+              <a:t>provider</a:t>
+            </a:r>
+            <a:r>
+              <a:rPr lang="da-DK" sz="1400" dirty="0"/>
+              <a:t>. If the </a:t>
+            </a:r>
+            <a:r>
+              <a:rPr lang="da-DK" sz="1400" dirty="0" err="1"/>
+              <a:t>openid</a:t>
+            </a:r>
+            <a:r>
+              <a:rPr lang="da-DK" sz="1400" dirty="0"/>
+              <a:t> </a:t>
+            </a:r>
+            <a:r>
+              <a:rPr lang="da-DK" sz="1400" dirty="0" err="1"/>
+              <a:t>provider</a:t>
+            </a:r>
+            <a:r>
+              <a:rPr lang="da-DK" sz="1400" dirty="0"/>
+              <a:t> is </a:t>
+            </a:r>
+            <a:r>
+              <a:rPr lang="da-DK" sz="1400" dirty="0" err="1"/>
+              <a:t>inside</a:t>
+            </a:r>
+            <a:r>
+              <a:rPr lang="da-DK" sz="1400" dirty="0"/>
+              <a:t> </a:t>
+            </a:r>
+          </a:p>
+          <a:p>
+            <a:pPr lvl="2"/>
+            <a:r>
+              <a:rPr lang="da-DK" sz="1400" dirty="0" err="1"/>
+              <a:t>Secutity</a:t>
+            </a:r>
+            <a:r>
+              <a:rPr lang="da-DK" sz="1400" dirty="0"/>
+              <a:t> </a:t>
+            </a:r>
+            <a:r>
+              <a:rPr lang="da-DK" sz="1400" dirty="0" err="1"/>
+              <a:t>group</a:t>
+            </a:r>
+            <a:r>
+              <a:rPr lang="da-DK" sz="1400" dirty="0"/>
+              <a:t> </a:t>
+            </a:r>
+            <a:r>
+              <a:rPr lang="da-DK" sz="1400" dirty="0" err="1"/>
+              <a:t>that</a:t>
+            </a:r>
+            <a:r>
+              <a:rPr lang="da-DK" sz="1400" dirty="0"/>
+              <a:t> </a:t>
+            </a:r>
+            <a:r>
+              <a:rPr lang="da-DK" sz="1400" dirty="0" err="1"/>
+              <a:t>allows</a:t>
+            </a:r>
+            <a:r>
+              <a:rPr lang="da-DK" sz="1400" dirty="0"/>
+              <a:t> </a:t>
+            </a:r>
+            <a:r>
+              <a:rPr lang="da-DK" sz="1400" dirty="0" err="1"/>
+              <a:t>ecs</a:t>
+            </a:r>
+            <a:r>
+              <a:rPr lang="da-DK" sz="1400" dirty="0"/>
+              <a:t> service to </a:t>
+            </a:r>
+            <a:r>
+              <a:rPr lang="da-DK" sz="1400" dirty="0" err="1"/>
+              <a:t>call</a:t>
+            </a:r>
+            <a:r>
+              <a:rPr lang="da-DK" sz="1400" dirty="0"/>
+              <a:t> RDS</a:t>
+            </a:r>
+          </a:p>
+          <a:p>
+            <a:pPr lvl="2"/>
+            <a:r>
+              <a:rPr lang="da-DK" sz="1400" dirty="0"/>
+              <a:t>IAM </a:t>
+            </a:r>
+            <a:r>
+              <a:rPr lang="da-DK" sz="1400" dirty="0" err="1"/>
+              <a:t>roles</a:t>
+            </a:r>
+            <a:r>
+              <a:rPr lang="da-DK" sz="1400" dirty="0"/>
+              <a:t> </a:t>
+            </a:r>
+            <a:r>
+              <a:rPr lang="da-DK" sz="1400" dirty="0" err="1"/>
+              <a:t>that</a:t>
+            </a:r>
+            <a:r>
+              <a:rPr lang="da-DK" sz="1400" dirty="0"/>
+              <a:t> </a:t>
+            </a:r>
+            <a:r>
+              <a:rPr lang="da-DK" sz="1400" dirty="0" err="1"/>
+              <a:t>lock</a:t>
+            </a:r>
+            <a:r>
+              <a:rPr lang="da-DK" sz="1400" dirty="0"/>
+              <a:t> </a:t>
+            </a:r>
+            <a:r>
+              <a:rPr lang="da-DK" sz="1400" dirty="0" err="1"/>
+              <a:t>down</a:t>
+            </a:r>
+            <a:r>
+              <a:rPr lang="da-DK" sz="1400" dirty="0"/>
+              <a:t> </a:t>
+            </a:r>
+            <a:r>
+              <a:rPr lang="da-DK" sz="1400" dirty="0" err="1"/>
+              <a:t>access</a:t>
+            </a:r>
+            <a:r>
+              <a:rPr lang="da-DK" sz="1400" dirty="0"/>
+              <a:t> to </a:t>
+            </a:r>
+            <a:r>
+              <a:rPr lang="da-DK" sz="1400" dirty="0" err="1"/>
+              <a:t>only</a:t>
+            </a:r>
+            <a:r>
+              <a:rPr lang="da-DK" sz="1400" dirty="0"/>
+              <a:t> the </a:t>
+            </a:r>
+            <a:r>
+              <a:rPr lang="da-DK" sz="1400" dirty="0" err="1"/>
+              <a:t>resources</a:t>
+            </a:r>
+            <a:r>
+              <a:rPr lang="da-DK" sz="1400" dirty="0"/>
+              <a:t> </a:t>
+            </a:r>
+            <a:r>
+              <a:rPr lang="da-DK" sz="1400" dirty="0" err="1"/>
+              <a:t>that</a:t>
+            </a:r>
+            <a:r>
+              <a:rPr lang="da-DK" sz="1400" dirty="0"/>
+              <a:t> </a:t>
+            </a:r>
+            <a:r>
+              <a:rPr lang="da-DK" sz="1400" dirty="0" err="1"/>
+              <a:t>should</a:t>
+            </a:r>
+            <a:r>
+              <a:rPr lang="da-DK" sz="1400" dirty="0"/>
+              <a:t> </a:t>
+            </a:r>
+            <a:r>
+              <a:rPr lang="da-DK" sz="1400" dirty="0" err="1"/>
+              <a:t>be</a:t>
+            </a:r>
+            <a:r>
+              <a:rPr lang="da-DK" sz="1400" dirty="0"/>
+              <a:t> </a:t>
+            </a:r>
+            <a:r>
+              <a:rPr lang="da-DK" sz="1400" dirty="0" err="1"/>
+              <a:t>accessed</a:t>
+            </a:r>
+            <a:r>
+              <a:rPr lang="da-DK" sz="1400" dirty="0"/>
+              <a:t>.</a:t>
+            </a:r>
+          </a:p>
+          <a:p>
+            <a:pPr lvl="2"/>
+            <a:r>
+              <a:rPr lang="da-DK" sz="1400" dirty="0" err="1"/>
+              <a:t>Autoscaling</a:t>
+            </a:r>
+            <a:r>
+              <a:rPr lang="da-DK" sz="1400" dirty="0"/>
+              <a:t> on cpu / </a:t>
+            </a:r>
+            <a:r>
+              <a:rPr lang="da-DK" sz="1400" dirty="0" err="1"/>
+              <a:t>mem</a:t>
+            </a:r>
             <a:endParaRPr lang="da-DK" sz="1400" dirty="0"/>
           </a:p>
           <a:p>
+            <a:pPr marL="457200" lvl="1" indent="0">
+              <a:buNone/>
+            </a:pPr>
+            <a:endParaRPr lang="da-DK" sz="1400" dirty="0"/>
+          </a:p>
+          <a:p>
             <a:pPr lvl="1"/>
-            <a:endParaRPr lang="da-DK" sz="1000" dirty="0"/>
-          </a:p>
-          <a:p>
-            <a:pPr lvl="1"/>
-            <a:endParaRPr lang="da-DK" sz="800" dirty="0"/>
+            <a:r>
+              <a:rPr lang="da-DK" sz="1400" dirty="0" err="1"/>
+              <a:t>OpenId</a:t>
+            </a:r>
+            <a:r>
+              <a:rPr lang="da-DK" sz="1400" dirty="0"/>
+              <a:t> </a:t>
+            </a:r>
+            <a:r>
+              <a:rPr lang="da-DK" sz="1400" dirty="0" err="1"/>
+              <a:t>provider</a:t>
+            </a:r>
+            <a:endParaRPr lang="da-DK" sz="1400" dirty="0"/>
+          </a:p>
+          <a:p>
+            <a:pPr lvl="2"/>
+            <a:r>
+              <a:rPr lang="da-DK" sz="1400" b="0" i="0" u="none" strike="noStrike" dirty="0">
+                <a:effectLst/>
+                <a:latin typeface="Inter"/>
+              </a:rPr>
+              <a:t>AWS </a:t>
+            </a:r>
+            <a:r>
+              <a:rPr lang="da-DK" sz="1400" b="0" i="0" u="none" strike="noStrike" dirty="0" err="1">
+                <a:effectLst/>
+                <a:latin typeface="Inter"/>
+              </a:rPr>
+              <a:t>identity</a:t>
+            </a:r>
+            <a:r>
+              <a:rPr lang="da-DK" sz="1400" b="0" i="0" u="none" strike="noStrike" dirty="0">
+                <a:effectLst/>
+                <a:latin typeface="Inter"/>
+              </a:rPr>
+              <a:t> </a:t>
+            </a:r>
+            <a:r>
+              <a:rPr lang="da-DK" sz="1400" b="0" i="0" u="none" strike="noStrike" dirty="0" err="1">
+                <a:effectLst/>
+                <a:latin typeface="Inter"/>
+              </a:rPr>
+              <a:t>provider</a:t>
+            </a:r>
+            <a:r>
+              <a:rPr lang="da-DK" sz="1400" b="0" i="0" u="none" strike="noStrike" dirty="0">
+                <a:effectLst/>
+                <a:latin typeface="Inter"/>
+              </a:rPr>
+              <a:t> for auth0.</a:t>
+            </a:r>
+            <a:endParaRPr lang="da-DK" sz="1400" dirty="0"/>
           </a:p>
         </p:txBody>
       </p:sp>
     </p:spTree>
     <p:extLst>
       <p:ext uri="{BB962C8B-B14F-4D97-AF65-F5344CB8AC3E}">
-        <p14:creationId xmlns:p14="http://schemas.microsoft.com/office/powerpoint/2010/main" val="1607170623"/>
+        <p14:creationId xmlns:p14="http://schemas.microsoft.com/office/powerpoint/2010/main" val="4004788508"/>
       </p:ext>
     </p:extLst>
   </p:cSld>

</xml_diff>